<commit_message>
Updated regex to take care of some problems
</commit_message>
<xml_diff>
--- a/Powerpoint Overview.pptx
+++ b/Powerpoint Overview.pptx
@@ -4,24 +4,26 @@
   <p:sldMasterIdLst>
     <p:sldMasterId id="2147483648" r:id="rId1"/>
   </p:sldMasterIdLst>
+  <p:notesMasterIdLst>
+    <p:notesMasterId r:id="rId18"/>
+  </p:notesMasterIdLst>
   <p:sldIdLst>
     <p:sldId id="256" r:id="rId2"/>
-    <p:sldId id="267" r:id="rId3"/>
-    <p:sldId id="257" r:id="rId4"/>
-    <p:sldId id="258" r:id="rId5"/>
-    <p:sldId id="263" r:id="rId6"/>
-    <p:sldId id="259" r:id="rId7"/>
-    <p:sldId id="260" r:id="rId8"/>
-    <p:sldId id="261" r:id="rId9"/>
-    <p:sldId id="264" r:id="rId10"/>
-    <p:sldId id="265" r:id="rId11"/>
-    <p:sldId id="268" r:id="rId12"/>
-    <p:sldId id="269" r:id="rId13"/>
-    <p:sldId id="270" r:id="rId14"/>
-    <p:sldId id="271" r:id="rId15"/>
-    <p:sldId id="262" r:id="rId16"/>
-    <p:sldId id="272" r:id="rId17"/>
-    <p:sldId id="273" r:id="rId18"/>
+    <p:sldId id="257" r:id="rId3"/>
+    <p:sldId id="258" r:id="rId4"/>
+    <p:sldId id="263" r:id="rId5"/>
+    <p:sldId id="259" r:id="rId6"/>
+    <p:sldId id="260" r:id="rId7"/>
+    <p:sldId id="261" r:id="rId8"/>
+    <p:sldId id="264" r:id="rId9"/>
+    <p:sldId id="265" r:id="rId10"/>
+    <p:sldId id="268" r:id="rId11"/>
+    <p:sldId id="269" r:id="rId12"/>
+    <p:sldId id="270" r:id="rId13"/>
+    <p:sldId id="271" r:id="rId14"/>
+    <p:sldId id="262" r:id="rId15"/>
+    <p:sldId id="272" r:id="rId16"/>
+    <p:sldId id="273" r:id="rId17"/>
   </p:sldIdLst>
   <p:sldSz cx="12192000" cy="6858000"/>
   <p:notesSz cx="6858000" cy="9144000"/>
@@ -120,7 +122,529 @@
       </a:defRPr>
     </a:lvl9pPr>
   </p:defaultTextStyle>
+  <p:extLst>
+    <p:ext uri="{EFAFB233-063F-42B5-8137-9DF3F51BA10A}">
+      <p15:sldGuideLst xmlns:p15="http://schemas.microsoft.com/office/powerpoint/2012/main"/>
+    </p:ext>
+  </p:extLst>
 </p:presentation>
+</file>
+
+<file path=ppt/notesMasters/notesMaster1.xml><?xml version="1.0" encoding="utf-8"?>
+<p:notesMaster xmlns:a="http://schemas.openxmlformats.org/drawingml/2006/main" xmlns:r="http://schemas.openxmlformats.org/officeDocument/2006/relationships" xmlns:p="http://schemas.openxmlformats.org/presentationml/2006/main">
+  <p:cSld>
+    <p:bg>
+      <p:bgRef idx="1001">
+        <a:schemeClr val="bg1"/>
+      </p:bgRef>
+    </p:bg>
+    <p:spTree>
+      <p:nvGrpSpPr>
+        <p:cNvPr id="1" name=""/>
+        <p:cNvGrpSpPr/>
+        <p:nvPr/>
+      </p:nvGrpSpPr>
+      <p:grpSpPr>
+        <a:xfrm>
+          <a:off x="0" y="0"/>
+          <a:ext cx="0" cy="0"/>
+          <a:chOff x="0" y="0"/>
+          <a:chExt cx="0" cy="0"/>
+        </a:xfrm>
+      </p:grpSpPr>
+      <p:sp>
+        <p:nvSpPr>
+          <p:cNvPr id="2" name="Header Placeholder 1"/>
+          <p:cNvSpPr>
+            <a:spLocks noGrp="1"/>
+          </p:cNvSpPr>
+          <p:nvPr>
+            <p:ph type="hdr" sz="quarter"/>
+          </p:nvPr>
+        </p:nvSpPr>
+        <p:spPr>
+          <a:xfrm>
+            <a:off x="0" y="0"/>
+            <a:ext cx="2971800" cy="458788"/>
+          </a:xfrm>
+          <a:prstGeom prst="rect">
+            <a:avLst/>
+          </a:prstGeom>
+        </p:spPr>
+        <p:txBody>
+          <a:bodyPr vert="horz" lIns="91440" tIns="45720" rIns="91440" bIns="45720" rtlCol="0"/>
+          <a:lstStyle>
+            <a:lvl1pPr algn="l">
+              <a:defRPr sz="1200"/>
+            </a:lvl1pPr>
+          </a:lstStyle>
+          <a:p>
+            <a:endParaRPr lang="en-US"/>
+          </a:p>
+        </p:txBody>
+      </p:sp>
+      <p:sp>
+        <p:nvSpPr>
+          <p:cNvPr id="3" name="Date Placeholder 2"/>
+          <p:cNvSpPr>
+            <a:spLocks noGrp="1"/>
+          </p:cNvSpPr>
+          <p:nvPr>
+            <p:ph type="dt" idx="1"/>
+          </p:nvPr>
+        </p:nvSpPr>
+        <p:spPr>
+          <a:xfrm>
+            <a:off x="3884613" y="0"/>
+            <a:ext cx="2971800" cy="458788"/>
+          </a:xfrm>
+          <a:prstGeom prst="rect">
+            <a:avLst/>
+          </a:prstGeom>
+        </p:spPr>
+        <p:txBody>
+          <a:bodyPr vert="horz" lIns="91440" tIns="45720" rIns="91440" bIns="45720" rtlCol="0"/>
+          <a:lstStyle>
+            <a:lvl1pPr algn="r">
+              <a:defRPr sz="1200"/>
+            </a:lvl1pPr>
+          </a:lstStyle>
+          <a:p>
+            <a:fld id="{388941DF-F237-2E43-96C1-0D5FA3DE0BB5}" type="datetimeFigureOut">
+              <a:rPr lang="en-US" smtClean="0"/>
+              <a:t>7/31/21</a:t>
+            </a:fld>
+            <a:endParaRPr lang="en-US"/>
+          </a:p>
+        </p:txBody>
+      </p:sp>
+      <p:sp>
+        <p:nvSpPr>
+          <p:cNvPr id="4" name="Slide Image Placeholder 3"/>
+          <p:cNvSpPr>
+            <a:spLocks noGrp="1" noRot="1" noChangeAspect="1"/>
+          </p:cNvSpPr>
+          <p:nvPr>
+            <p:ph type="sldImg" idx="2"/>
+          </p:nvPr>
+        </p:nvSpPr>
+        <p:spPr>
+          <a:xfrm>
+            <a:off x="685800" y="1143000"/>
+            <a:ext cx="5486400" cy="3086100"/>
+          </a:xfrm>
+          <a:prstGeom prst="rect">
+            <a:avLst/>
+          </a:prstGeom>
+          <a:noFill/>
+          <a:ln w="12700">
+            <a:solidFill>
+              <a:prstClr val="black"/>
+            </a:solidFill>
+          </a:ln>
+        </p:spPr>
+        <p:txBody>
+          <a:bodyPr vert="horz" lIns="91440" tIns="45720" rIns="91440" bIns="45720" rtlCol="0" anchor="ctr"/>
+          <a:lstStyle/>
+          <a:p>
+            <a:endParaRPr lang="en-US"/>
+          </a:p>
+        </p:txBody>
+      </p:sp>
+      <p:sp>
+        <p:nvSpPr>
+          <p:cNvPr id="5" name="Notes Placeholder 4"/>
+          <p:cNvSpPr>
+            <a:spLocks noGrp="1"/>
+          </p:cNvSpPr>
+          <p:nvPr>
+            <p:ph type="body" sz="quarter" idx="3"/>
+          </p:nvPr>
+        </p:nvSpPr>
+        <p:spPr>
+          <a:xfrm>
+            <a:off x="685800" y="4400550"/>
+            <a:ext cx="5486400" cy="3600450"/>
+          </a:xfrm>
+          <a:prstGeom prst="rect">
+            <a:avLst/>
+          </a:prstGeom>
+        </p:spPr>
+        <p:txBody>
+          <a:bodyPr vert="horz" lIns="91440" tIns="45720" rIns="91440" bIns="45720" rtlCol="0"/>
+          <a:lstStyle/>
+          <a:p>
+            <a:pPr lvl="0"/>
+            <a:r>
+              <a:rPr lang="en-US"/>
+              <a:t>Click to edit Master text styles</a:t>
+            </a:r>
+          </a:p>
+          <a:p>
+            <a:pPr lvl="1"/>
+            <a:r>
+              <a:rPr lang="en-US"/>
+              <a:t>Second level</a:t>
+            </a:r>
+          </a:p>
+          <a:p>
+            <a:pPr lvl="2"/>
+            <a:r>
+              <a:rPr lang="en-US"/>
+              <a:t>Third level</a:t>
+            </a:r>
+          </a:p>
+          <a:p>
+            <a:pPr lvl="3"/>
+            <a:r>
+              <a:rPr lang="en-US"/>
+              <a:t>Fourth level</a:t>
+            </a:r>
+          </a:p>
+          <a:p>
+            <a:pPr lvl="4"/>
+            <a:r>
+              <a:rPr lang="en-US"/>
+              <a:t>Fifth level</a:t>
+            </a:r>
+          </a:p>
+        </p:txBody>
+      </p:sp>
+      <p:sp>
+        <p:nvSpPr>
+          <p:cNvPr id="6" name="Footer Placeholder 5"/>
+          <p:cNvSpPr>
+            <a:spLocks noGrp="1"/>
+          </p:cNvSpPr>
+          <p:nvPr>
+            <p:ph type="ftr" sz="quarter" idx="4"/>
+          </p:nvPr>
+        </p:nvSpPr>
+        <p:spPr>
+          <a:xfrm>
+            <a:off x="0" y="8685213"/>
+            <a:ext cx="2971800" cy="458787"/>
+          </a:xfrm>
+          <a:prstGeom prst="rect">
+            <a:avLst/>
+          </a:prstGeom>
+        </p:spPr>
+        <p:txBody>
+          <a:bodyPr vert="horz" lIns="91440" tIns="45720" rIns="91440" bIns="45720" rtlCol="0" anchor="b"/>
+          <a:lstStyle>
+            <a:lvl1pPr algn="l">
+              <a:defRPr sz="1200"/>
+            </a:lvl1pPr>
+          </a:lstStyle>
+          <a:p>
+            <a:endParaRPr lang="en-US"/>
+          </a:p>
+        </p:txBody>
+      </p:sp>
+      <p:sp>
+        <p:nvSpPr>
+          <p:cNvPr id="7" name="Slide Number Placeholder 6"/>
+          <p:cNvSpPr>
+            <a:spLocks noGrp="1"/>
+          </p:cNvSpPr>
+          <p:nvPr>
+            <p:ph type="sldNum" sz="quarter" idx="5"/>
+          </p:nvPr>
+        </p:nvSpPr>
+        <p:spPr>
+          <a:xfrm>
+            <a:off x="3884613" y="8685213"/>
+            <a:ext cx="2971800" cy="458787"/>
+          </a:xfrm>
+          <a:prstGeom prst="rect">
+            <a:avLst/>
+          </a:prstGeom>
+        </p:spPr>
+        <p:txBody>
+          <a:bodyPr vert="horz" lIns="91440" tIns="45720" rIns="91440" bIns="45720" rtlCol="0" anchor="b"/>
+          <a:lstStyle>
+            <a:lvl1pPr algn="r">
+              <a:defRPr sz="1200"/>
+            </a:lvl1pPr>
+          </a:lstStyle>
+          <a:p>
+            <a:fld id="{DB7F5679-9C7C-8844-9451-745BCC721BF6}" type="slidenum">
+              <a:rPr lang="en-US" smtClean="0"/>
+              <a:t>‹#›</a:t>
+            </a:fld>
+            <a:endParaRPr lang="en-US"/>
+          </a:p>
+        </p:txBody>
+      </p:sp>
+    </p:spTree>
+    <p:extLst>
+      <p:ext uri="{BB962C8B-B14F-4D97-AF65-F5344CB8AC3E}">
+        <p14:creationId xmlns:p14="http://schemas.microsoft.com/office/powerpoint/2010/main" val="1136272114"/>
+      </p:ext>
+    </p:extLst>
+  </p:cSld>
+  <p:clrMap bg1="lt1" tx1="dk1" bg2="lt2" tx2="dk2" accent1="accent1" accent2="accent2" accent3="accent3" accent4="accent4" accent5="accent5" accent6="accent6" hlink="hlink" folHlink="folHlink"/>
+  <p:notesStyle>
+    <a:lvl1pPr marL="0" algn="l" defTabSz="914400" rtl="0" eaLnBrk="1" latinLnBrk="0" hangingPunct="1">
+      <a:defRPr sz="1200" kern="1200">
+        <a:solidFill>
+          <a:schemeClr val="tx1"/>
+        </a:solidFill>
+        <a:latin typeface="+mn-lt"/>
+        <a:ea typeface="+mn-ea"/>
+        <a:cs typeface="+mn-cs"/>
+      </a:defRPr>
+    </a:lvl1pPr>
+    <a:lvl2pPr marL="457200" algn="l" defTabSz="914400" rtl="0" eaLnBrk="1" latinLnBrk="0" hangingPunct="1">
+      <a:defRPr sz="1200" kern="1200">
+        <a:solidFill>
+          <a:schemeClr val="tx1"/>
+        </a:solidFill>
+        <a:latin typeface="+mn-lt"/>
+        <a:ea typeface="+mn-ea"/>
+        <a:cs typeface="+mn-cs"/>
+      </a:defRPr>
+    </a:lvl2pPr>
+    <a:lvl3pPr marL="914400" algn="l" defTabSz="914400" rtl="0" eaLnBrk="1" latinLnBrk="0" hangingPunct="1">
+      <a:defRPr sz="1200" kern="1200">
+        <a:solidFill>
+          <a:schemeClr val="tx1"/>
+        </a:solidFill>
+        <a:latin typeface="+mn-lt"/>
+        <a:ea typeface="+mn-ea"/>
+        <a:cs typeface="+mn-cs"/>
+      </a:defRPr>
+    </a:lvl3pPr>
+    <a:lvl4pPr marL="1371600" algn="l" defTabSz="914400" rtl="0" eaLnBrk="1" latinLnBrk="0" hangingPunct="1">
+      <a:defRPr sz="1200" kern="1200">
+        <a:solidFill>
+          <a:schemeClr val="tx1"/>
+        </a:solidFill>
+        <a:latin typeface="+mn-lt"/>
+        <a:ea typeface="+mn-ea"/>
+        <a:cs typeface="+mn-cs"/>
+      </a:defRPr>
+    </a:lvl4pPr>
+    <a:lvl5pPr marL="1828800" algn="l" defTabSz="914400" rtl="0" eaLnBrk="1" latinLnBrk="0" hangingPunct="1">
+      <a:defRPr sz="1200" kern="1200">
+        <a:solidFill>
+          <a:schemeClr val="tx1"/>
+        </a:solidFill>
+        <a:latin typeface="+mn-lt"/>
+        <a:ea typeface="+mn-ea"/>
+        <a:cs typeface="+mn-cs"/>
+      </a:defRPr>
+    </a:lvl5pPr>
+    <a:lvl6pPr marL="2286000" algn="l" defTabSz="914400" rtl="0" eaLnBrk="1" latinLnBrk="0" hangingPunct="1">
+      <a:defRPr sz="1200" kern="1200">
+        <a:solidFill>
+          <a:schemeClr val="tx1"/>
+        </a:solidFill>
+        <a:latin typeface="+mn-lt"/>
+        <a:ea typeface="+mn-ea"/>
+        <a:cs typeface="+mn-cs"/>
+      </a:defRPr>
+    </a:lvl6pPr>
+    <a:lvl7pPr marL="2743200" algn="l" defTabSz="914400" rtl="0" eaLnBrk="1" latinLnBrk="0" hangingPunct="1">
+      <a:defRPr sz="1200" kern="1200">
+        <a:solidFill>
+          <a:schemeClr val="tx1"/>
+        </a:solidFill>
+        <a:latin typeface="+mn-lt"/>
+        <a:ea typeface="+mn-ea"/>
+        <a:cs typeface="+mn-cs"/>
+      </a:defRPr>
+    </a:lvl7pPr>
+    <a:lvl8pPr marL="3200400" algn="l" defTabSz="914400" rtl="0" eaLnBrk="1" latinLnBrk="0" hangingPunct="1">
+      <a:defRPr sz="1200" kern="1200">
+        <a:solidFill>
+          <a:schemeClr val="tx1"/>
+        </a:solidFill>
+        <a:latin typeface="+mn-lt"/>
+        <a:ea typeface="+mn-ea"/>
+        <a:cs typeface="+mn-cs"/>
+      </a:defRPr>
+    </a:lvl8pPr>
+    <a:lvl9pPr marL="3657600" algn="l" defTabSz="914400" rtl="0" eaLnBrk="1" latinLnBrk="0" hangingPunct="1">
+      <a:defRPr sz="1200" kern="1200">
+        <a:solidFill>
+          <a:schemeClr val="tx1"/>
+        </a:solidFill>
+        <a:latin typeface="+mn-lt"/>
+        <a:ea typeface="+mn-ea"/>
+        <a:cs typeface="+mn-cs"/>
+      </a:defRPr>
+    </a:lvl9pPr>
+  </p:notesStyle>
+</p:notesMaster>
+</file>
+
+<file path=ppt/notesSlides/notesSlide1.xml><?xml version="1.0" encoding="utf-8"?>
+<p:notes xmlns:a="http://schemas.openxmlformats.org/drawingml/2006/main" xmlns:r="http://schemas.openxmlformats.org/officeDocument/2006/relationships" xmlns:p="http://schemas.openxmlformats.org/presentationml/2006/main">
+  <p:cSld>
+    <p:spTree>
+      <p:nvGrpSpPr>
+        <p:cNvPr id="1" name=""/>
+        <p:cNvGrpSpPr/>
+        <p:nvPr/>
+      </p:nvGrpSpPr>
+      <p:grpSpPr>
+        <a:xfrm>
+          <a:off x="0" y="0"/>
+          <a:ext cx="0" cy="0"/>
+          <a:chOff x="0" y="0"/>
+          <a:chExt cx="0" cy="0"/>
+        </a:xfrm>
+      </p:grpSpPr>
+      <p:sp>
+        <p:nvSpPr>
+          <p:cNvPr id="2" name="Slide Image Placeholder 1"/>
+          <p:cNvSpPr>
+            <a:spLocks noGrp="1" noRot="1" noChangeAspect="1"/>
+          </p:cNvSpPr>
+          <p:nvPr>
+            <p:ph type="sldImg"/>
+          </p:nvPr>
+        </p:nvSpPr>
+        <p:spPr/>
+      </p:sp>
+      <p:sp>
+        <p:nvSpPr>
+          <p:cNvPr id="3" name="Notes Placeholder 2"/>
+          <p:cNvSpPr>
+            <a:spLocks noGrp="1"/>
+          </p:cNvSpPr>
+          <p:nvPr>
+            <p:ph type="body" idx="1"/>
+          </p:nvPr>
+        </p:nvSpPr>
+        <p:spPr/>
+        <p:txBody>
+          <a:bodyPr/>
+          <a:lstStyle/>
+          <a:p>
+            <a:endParaRPr lang="en-US" dirty="0"/>
+          </a:p>
+        </p:txBody>
+      </p:sp>
+      <p:sp>
+        <p:nvSpPr>
+          <p:cNvPr id="4" name="Slide Number Placeholder 3"/>
+          <p:cNvSpPr>
+            <a:spLocks noGrp="1"/>
+          </p:cNvSpPr>
+          <p:nvPr>
+            <p:ph type="sldNum" sz="quarter" idx="5"/>
+          </p:nvPr>
+        </p:nvSpPr>
+        <p:spPr/>
+        <p:txBody>
+          <a:bodyPr/>
+          <a:lstStyle/>
+          <a:p>
+            <a:fld id="{DB7F5679-9C7C-8844-9451-745BCC721BF6}" type="slidenum">
+              <a:rPr lang="en-US" smtClean="0"/>
+              <a:t>1</a:t>
+            </a:fld>
+            <a:endParaRPr lang="en-US"/>
+          </a:p>
+        </p:txBody>
+      </p:sp>
+    </p:spTree>
+    <p:extLst>
+      <p:ext uri="{BB962C8B-B14F-4D97-AF65-F5344CB8AC3E}">
+        <p14:creationId xmlns:p14="http://schemas.microsoft.com/office/powerpoint/2010/main" val="1147017084"/>
+      </p:ext>
+    </p:extLst>
+  </p:cSld>
+  <p:clrMapOvr>
+    <a:masterClrMapping/>
+  </p:clrMapOvr>
+</p:notes>
+</file>
+
+<file path=ppt/notesSlides/notesSlide2.xml><?xml version="1.0" encoding="utf-8"?>
+<p:notes xmlns:a="http://schemas.openxmlformats.org/drawingml/2006/main" xmlns:r="http://schemas.openxmlformats.org/officeDocument/2006/relationships" xmlns:p="http://schemas.openxmlformats.org/presentationml/2006/main">
+  <p:cSld>
+    <p:spTree>
+      <p:nvGrpSpPr>
+        <p:cNvPr id="1" name=""/>
+        <p:cNvGrpSpPr/>
+        <p:nvPr/>
+      </p:nvGrpSpPr>
+      <p:grpSpPr>
+        <a:xfrm>
+          <a:off x="0" y="0"/>
+          <a:ext cx="0" cy="0"/>
+          <a:chOff x="0" y="0"/>
+          <a:chExt cx="0" cy="0"/>
+        </a:xfrm>
+      </p:grpSpPr>
+      <p:sp>
+        <p:nvSpPr>
+          <p:cNvPr id="2" name="Slide Image Placeholder 1"/>
+          <p:cNvSpPr>
+            <a:spLocks noGrp="1" noRot="1" noChangeAspect="1"/>
+          </p:cNvSpPr>
+          <p:nvPr>
+            <p:ph type="sldImg"/>
+          </p:nvPr>
+        </p:nvSpPr>
+        <p:spPr/>
+      </p:sp>
+      <p:sp>
+        <p:nvSpPr>
+          <p:cNvPr id="3" name="Notes Placeholder 2"/>
+          <p:cNvSpPr>
+            <a:spLocks noGrp="1"/>
+          </p:cNvSpPr>
+          <p:nvPr>
+            <p:ph type="body" idx="1"/>
+          </p:nvPr>
+        </p:nvSpPr>
+        <p:spPr/>
+        <p:txBody>
+          <a:bodyPr/>
+          <a:lstStyle/>
+          <a:p>
+            <a:endParaRPr lang="en-US"/>
+          </a:p>
+        </p:txBody>
+      </p:sp>
+      <p:sp>
+        <p:nvSpPr>
+          <p:cNvPr id="4" name="Slide Number Placeholder 3"/>
+          <p:cNvSpPr>
+            <a:spLocks noGrp="1"/>
+          </p:cNvSpPr>
+          <p:nvPr>
+            <p:ph type="sldNum" sz="quarter" idx="5"/>
+          </p:nvPr>
+        </p:nvSpPr>
+        <p:spPr/>
+        <p:txBody>
+          <a:bodyPr/>
+          <a:lstStyle/>
+          <a:p>
+            <a:fld id="{DB7F5679-9C7C-8844-9451-745BCC721BF6}" type="slidenum">
+              <a:rPr lang="en-US" smtClean="0"/>
+              <a:t>8</a:t>
+            </a:fld>
+            <a:endParaRPr lang="en-US"/>
+          </a:p>
+        </p:txBody>
+      </p:sp>
+    </p:spTree>
+    <p:extLst>
+      <p:ext uri="{BB962C8B-B14F-4D97-AF65-F5344CB8AC3E}">
+        <p14:creationId xmlns:p14="http://schemas.microsoft.com/office/powerpoint/2010/main" val="3150185774"/>
+      </p:ext>
+    </p:extLst>
+  </p:cSld>
+  <p:clrMapOvr>
+    <a:masterClrMapping/>
+  </p:clrMapOvr>
+</p:notes>
 </file>
 
 <file path=ppt/slideLayouts/slideLayout1.xml><?xml version="1.0" encoding="utf-8"?>
@@ -270,7 +794,7 @@
           <a:p>
             <a:fld id="{9FB099AD-F008-0F44-B510-B51CBAE24753}" type="datetimeFigureOut">
               <a:rPr lang="en-US" smtClean="0"/>
-              <a:t>1/1/21</a:t>
+              <a:t>7/31/21</a:t>
             </a:fld>
             <a:endParaRPr lang="en-US"/>
           </a:p>
@@ -468,7 +992,7 @@
           <a:p>
             <a:fld id="{9FB099AD-F008-0F44-B510-B51CBAE24753}" type="datetimeFigureOut">
               <a:rPr lang="en-US" smtClean="0"/>
-              <a:t>1/1/21</a:t>
+              <a:t>7/31/21</a:t>
             </a:fld>
             <a:endParaRPr lang="en-US"/>
           </a:p>
@@ -676,7 +1200,7 @@
           <a:p>
             <a:fld id="{9FB099AD-F008-0F44-B510-B51CBAE24753}" type="datetimeFigureOut">
               <a:rPr lang="en-US" smtClean="0"/>
-              <a:t>1/1/21</a:t>
+              <a:t>7/31/21</a:t>
             </a:fld>
             <a:endParaRPr lang="en-US"/>
           </a:p>
@@ -874,7 +1398,7 @@
           <a:p>
             <a:fld id="{9FB099AD-F008-0F44-B510-B51CBAE24753}" type="datetimeFigureOut">
               <a:rPr lang="en-US" smtClean="0"/>
-              <a:t>1/1/21</a:t>
+              <a:t>7/31/21</a:t>
             </a:fld>
             <a:endParaRPr lang="en-US"/>
           </a:p>
@@ -1149,7 +1673,7 @@
           <a:p>
             <a:fld id="{9FB099AD-F008-0F44-B510-B51CBAE24753}" type="datetimeFigureOut">
               <a:rPr lang="en-US" smtClean="0"/>
-              <a:t>1/1/21</a:t>
+              <a:t>7/31/21</a:t>
             </a:fld>
             <a:endParaRPr lang="en-US"/>
           </a:p>
@@ -1414,7 +1938,7 @@
           <a:p>
             <a:fld id="{9FB099AD-F008-0F44-B510-B51CBAE24753}" type="datetimeFigureOut">
               <a:rPr lang="en-US" smtClean="0"/>
-              <a:t>1/1/21</a:t>
+              <a:t>7/31/21</a:t>
             </a:fld>
             <a:endParaRPr lang="en-US"/>
           </a:p>
@@ -1826,7 +2350,7 @@
           <a:p>
             <a:fld id="{9FB099AD-F008-0F44-B510-B51CBAE24753}" type="datetimeFigureOut">
               <a:rPr lang="en-US" smtClean="0"/>
-              <a:t>1/1/21</a:t>
+              <a:t>7/31/21</a:t>
             </a:fld>
             <a:endParaRPr lang="en-US"/>
           </a:p>
@@ -1967,7 +2491,7 @@
           <a:p>
             <a:fld id="{9FB099AD-F008-0F44-B510-B51CBAE24753}" type="datetimeFigureOut">
               <a:rPr lang="en-US" smtClean="0"/>
-              <a:t>1/1/21</a:t>
+              <a:t>7/31/21</a:t>
             </a:fld>
             <a:endParaRPr lang="en-US"/>
           </a:p>
@@ -2080,7 +2604,7 @@
           <a:p>
             <a:fld id="{9FB099AD-F008-0F44-B510-B51CBAE24753}" type="datetimeFigureOut">
               <a:rPr lang="en-US" smtClean="0"/>
-              <a:t>1/1/21</a:t>
+              <a:t>7/31/21</a:t>
             </a:fld>
             <a:endParaRPr lang="en-US"/>
           </a:p>
@@ -2391,7 +2915,7 @@
           <a:p>
             <a:fld id="{9FB099AD-F008-0F44-B510-B51CBAE24753}" type="datetimeFigureOut">
               <a:rPr lang="en-US" smtClean="0"/>
-              <a:t>1/1/21</a:t>
+              <a:t>7/31/21</a:t>
             </a:fld>
             <a:endParaRPr lang="en-US"/>
           </a:p>
@@ -2679,7 +3203,7 @@
           <a:p>
             <a:fld id="{9FB099AD-F008-0F44-B510-B51CBAE24753}" type="datetimeFigureOut">
               <a:rPr lang="en-US" smtClean="0"/>
-              <a:t>1/1/21</a:t>
+              <a:t>7/31/21</a:t>
             </a:fld>
             <a:endParaRPr lang="en-US"/>
           </a:p>
@@ -2920,7 +3444,7 @@
           <a:p>
             <a:fld id="{9FB099AD-F008-0F44-B510-B51CBAE24753}" type="datetimeFigureOut">
               <a:rPr lang="en-US" smtClean="0"/>
-              <a:t>1/1/21</a:t>
+              <a:t>7/31/21</a:t>
             </a:fld>
             <a:endParaRPr lang="en-US"/>
           </a:p>
@@ -3323,6 +3847,14 @@
 <file path=ppt/slides/slide1.xml><?xml version="1.0" encoding="utf-8"?>
 <p:sld xmlns:a="http://schemas.openxmlformats.org/drawingml/2006/main" xmlns:r="http://schemas.openxmlformats.org/officeDocument/2006/relationships" xmlns:p="http://schemas.openxmlformats.org/presentationml/2006/main">
   <p:cSld>
+    <p:bg>
+      <p:bgPr>
+        <a:solidFill>
+          <a:schemeClr val="tx1"/>
+        </a:solidFill>
+        <a:effectLst/>
+      </p:bgPr>
+    </p:bg>
     <p:spTree>
       <p:nvGrpSpPr>
         <p:cNvPr id="1" name=""/>
@@ -3337,6 +3869,102 @@
           <a:chExt cx="0" cy="0"/>
         </a:xfrm>
       </p:grpSpPr>
+      <p:pic>
+        <p:nvPicPr>
+          <p:cNvPr id="4" name="Picture 3" descr="Molecular glass structure">
+            <a:extLst>
+              <a:ext uri="{FF2B5EF4-FFF2-40B4-BE49-F238E27FC236}">
+                <a16:creationId xmlns:a16="http://schemas.microsoft.com/office/drawing/2014/main" id="{D51832C1-92E4-4087-9DF8-2D665C718A40}"/>
+              </a:ext>
+            </a:extLst>
+          </p:cNvPr>
+          <p:cNvPicPr>
+            <a:picLocks noChangeAspect="1"/>
+          </p:cNvPicPr>
+          <p:nvPr/>
+        </p:nvPicPr>
+        <p:blipFill rotWithShape="1">
+          <a:blip r:embed="rId3"/>
+          <a:srcRect/>
+          <a:stretch/>
+        </p:blipFill>
+        <p:spPr>
+          <a:xfrm>
+            <a:off x="20" y="10"/>
+            <a:ext cx="12191980" cy="6857990"/>
+          </a:xfrm>
+          <a:prstGeom prst="rect">
+            <a:avLst/>
+          </a:prstGeom>
+        </p:spPr>
+      </p:pic>
+      <p:sp>
+        <p:nvSpPr>
+          <p:cNvPr id="8" name="Rectangle 7">
+            <a:extLst>
+              <a:ext uri="{FF2B5EF4-FFF2-40B4-BE49-F238E27FC236}">
+                <a16:creationId xmlns:a16="http://schemas.microsoft.com/office/drawing/2014/main" id="{B4916930-E76E-4100-9DCF-4981566A372A}"/>
+              </a:ext>
+              <a:ext uri="{C183D7F6-B498-43B3-948B-1728B52AA6E4}">
+                <adec:decorative xmlns:adec="http://schemas.microsoft.com/office/drawing/2017/decorative" val="1"/>
+              </a:ext>
+            </a:extLst>
+          </p:cNvPr>
+          <p:cNvSpPr>
+            <a:spLocks noGrp="1" noRot="1" noChangeAspect="1" noMove="1" noResize="1" noEditPoints="1" noAdjustHandles="1" noChangeArrowheads="1" noChangeShapeType="1" noTextEdit="1"/>
+          </p:cNvSpPr>
+          <p:nvPr>
+            <p:extLst>
+              <p:ext uri="{386F3935-93C4-4BCD-93E2-E3B085C9AB24}">
+                <p16:designElem xmlns:p16="http://schemas.microsoft.com/office/powerpoint/2015/main" val="1"/>
+              </p:ext>
+            </p:extLst>
+          </p:nvPr>
+        </p:nvSpPr>
+        <p:spPr>
+          <a:xfrm>
+            <a:off x="1857375" y="1885950"/>
+            <a:ext cx="8505825" cy="3152775"/>
+          </a:xfrm>
+          <a:prstGeom prst="rect">
+            <a:avLst/>
+          </a:prstGeom>
+          <a:solidFill>
+            <a:schemeClr val="bg1">
+              <a:alpha val="75000"/>
+            </a:schemeClr>
+          </a:solidFill>
+          <a:ln w="63500" cmpd="dbl">
+            <a:solidFill>
+              <a:schemeClr val="bg1"/>
+            </a:solidFill>
+          </a:ln>
+        </p:spPr>
+        <p:style>
+          <a:lnRef idx="2">
+            <a:schemeClr val="accent1">
+              <a:shade val="50000"/>
+            </a:schemeClr>
+          </a:lnRef>
+          <a:fillRef idx="1">
+            <a:schemeClr val="accent1"/>
+          </a:fillRef>
+          <a:effectRef idx="0">
+            <a:schemeClr val="accent1"/>
+          </a:effectRef>
+          <a:fontRef idx="minor">
+            <a:schemeClr val="lt1"/>
+          </a:fontRef>
+        </p:style>
+        <p:txBody>
+          <a:bodyPr rtlCol="0" anchor="ctr"/>
+          <a:lstStyle/>
+          <a:p>
+            <a:pPr algn="ctr"/>
+            <a:endParaRPr lang="en-US"/>
+          </a:p>
+        </p:txBody>
+      </p:sp>
       <p:sp>
         <p:nvSpPr>
           <p:cNvPr id="2" name="Title 1">
@@ -3353,48 +3981,29 @@
             <p:ph type="ctrTitle"/>
           </p:nvPr>
         </p:nvSpPr>
-        <p:spPr/>
-        <p:txBody>
-          <a:bodyPr/>
-          <a:lstStyle/>
-          <a:p>
-            <a:r>
-              <a:rPr lang="en-US" dirty="0"/>
-              <a:t>Group Scheduler Genetic Algorithm</a:t>
-            </a:r>
-          </a:p>
-        </p:txBody>
-      </p:sp>
-      <p:sp>
-        <p:nvSpPr>
-          <p:cNvPr id="3" name="Subtitle 2">
-            <a:extLst>
-              <a:ext uri="{FF2B5EF4-FFF2-40B4-BE49-F238E27FC236}">
-                <a16:creationId xmlns:a16="http://schemas.microsoft.com/office/drawing/2014/main" id="{C6E96305-9998-4142-8648-3B3A0722D018}"/>
-              </a:ext>
-            </a:extLst>
-          </p:cNvPr>
-          <p:cNvSpPr>
-            <a:spLocks noGrp="1"/>
-          </p:cNvSpPr>
-          <p:nvPr>
-            <p:ph type="subTitle" idx="1"/>
-          </p:nvPr>
-        </p:nvSpPr>
-        <p:spPr/>
-        <p:txBody>
-          <a:bodyPr/>
-          <a:lstStyle/>
-          <a:p>
-            <a:r>
-              <a:rPr lang="en-US" dirty="0"/>
-              <a:t>Sam </a:t>
-            </a:r>
-            <a:r>
-              <a:rPr lang="en-US" dirty="0" err="1"/>
-              <a:t>Shenoi</a:t>
-            </a:r>
-            <a:endParaRPr lang="en-US" dirty="0"/>
+        <p:spPr>
+          <a:xfrm>
+            <a:off x="2276475" y="2247900"/>
+            <a:ext cx="7581900" cy="2514600"/>
+          </a:xfrm>
+        </p:spPr>
+        <p:txBody>
+          <a:bodyPr vert="horz" lIns="91440" tIns="45720" rIns="91440" bIns="45720" rtlCol="0" anchor="ctr">
+            <a:normAutofit/>
+          </a:bodyPr>
+          <a:lstStyle/>
+          <a:p>
+            <a:r>
+              <a:rPr lang="en-US" sz="6600" dirty="0">
+                <a:solidFill>
+                  <a:schemeClr val="tx1">
+                    <a:lumMod val="75000"/>
+                    <a:lumOff val="25000"/>
+                  </a:schemeClr>
+                </a:solidFill>
+              </a:rPr>
+              <a:t>Genetic Schedule Picker</a:t>
+            </a:r>
           </a:p>
         </p:txBody>
       </p:sp>
@@ -3433,15 +4042,15 @@
           <p:cNvPr id="2" name="Title 1">
             <a:extLst>
               <a:ext uri="{FF2B5EF4-FFF2-40B4-BE49-F238E27FC236}">
-                <a16:creationId xmlns:a16="http://schemas.microsoft.com/office/drawing/2014/main" id="{9947412D-25F5-B14C-9019-019C5C901ACB}"/>
-              </a:ext>
-            </a:extLst>
-          </p:cNvPr>
-          <p:cNvSpPr>
-            <a:spLocks noGrp="1"/>
-          </p:cNvSpPr>
-          <p:nvPr>
-            <p:ph type="title"/>
+                <a16:creationId xmlns:a16="http://schemas.microsoft.com/office/drawing/2014/main" id="{C7C5AEC9-6EE0-FF45-9839-6F1617C7584E}"/>
+              </a:ext>
+            </a:extLst>
+          </p:cNvPr>
+          <p:cNvSpPr>
+            <a:spLocks noGrp="1"/>
+          </p:cNvSpPr>
+          <p:nvPr>
+            <p:ph type="ctrTitle"/>
           </p:nvPr>
         </p:nvSpPr>
         <p:spPr/>
@@ -3451,25 +4060,25 @@
           <a:p>
             <a:r>
               <a:rPr lang="en-US" dirty="0"/>
-              <a:t>Good News :D</a:t>
-            </a:r>
-          </a:p>
-        </p:txBody>
-      </p:sp>
-      <p:sp>
-        <p:nvSpPr>
-          <p:cNvPr id="3" name="Content Placeholder 2">
-            <a:extLst>
-              <a:ext uri="{FF2B5EF4-FFF2-40B4-BE49-F238E27FC236}">
-                <a16:creationId xmlns:a16="http://schemas.microsoft.com/office/drawing/2014/main" id="{7E65FC7F-D1D1-CB45-8B82-9BF8700F75EF}"/>
-              </a:ext>
-            </a:extLst>
-          </p:cNvPr>
-          <p:cNvSpPr>
-            <a:spLocks noGrp="1"/>
-          </p:cNvSpPr>
-          <p:nvPr>
-            <p:ph idx="1"/>
+              <a:t>Running the Program</a:t>
+            </a:r>
+          </a:p>
+        </p:txBody>
+      </p:sp>
+      <p:sp>
+        <p:nvSpPr>
+          <p:cNvPr id="3" name="Subtitle 2">
+            <a:extLst>
+              <a:ext uri="{FF2B5EF4-FFF2-40B4-BE49-F238E27FC236}">
+                <a16:creationId xmlns:a16="http://schemas.microsoft.com/office/drawing/2014/main" id="{46B26E2D-2C9E-604A-A8CC-062DB52DD6A6}"/>
+              </a:ext>
+            </a:extLst>
+          </p:cNvPr>
+          <p:cNvSpPr>
+            <a:spLocks noGrp="1"/>
+          </p:cNvSpPr>
+          <p:nvPr>
+            <p:ph type="subTitle" idx="1"/>
           </p:nvPr>
         </p:nvSpPr>
         <p:spPr/>
@@ -3477,35 +4086,14 @@
           <a:bodyPr/>
           <a:lstStyle/>
           <a:p>
-            <a:r>
-              <a:rPr lang="en-US" dirty="0"/>
-              <a:t>A “pretty good” solution is found</a:t>
-            </a:r>
-          </a:p>
-          <a:p>
-            <a:r>
-              <a:rPr lang="en-US" dirty="0"/>
-              <a:t>Much much faster than exponential time (polynomial time instead of exponential) </a:t>
-            </a:r>
-          </a:p>
-          <a:p>
-            <a:r>
-              <a:rPr lang="en-US" dirty="0"/>
-              <a:t>Parameters and arguments are customizable </a:t>
-            </a:r>
-          </a:p>
-          <a:p>
-            <a:r>
-              <a:rPr lang="en-US" dirty="0"/>
-              <a:t>Group generated from the program are guaranteed to be accurate</a:t>
-            </a:r>
+            <a:endParaRPr lang="en-US"/>
           </a:p>
         </p:txBody>
       </p:sp>
     </p:spTree>
     <p:extLst>
       <p:ext uri="{BB962C8B-B14F-4D97-AF65-F5344CB8AC3E}">
-        <p14:creationId xmlns:p14="http://schemas.microsoft.com/office/powerpoint/2010/main" val="560373099"/>
+        <p14:creationId xmlns:p14="http://schemas.microsoft.com/office/powerpoint/2010/main" val="2377248946"/>
       </p:ext>
     </p:extLst>
   </p:cSld>
@@ -3537,89 +4125,6 @@
           <p:cNvPr id="2" name="Title 1">
             <a:extLst>
               <a:ext uri="{FF2B5EF4-FFF2-40B4-BE49-F238E27FC236}">
-                <a16:creationId xmlns:a16="http://schemas.microsoft.com/office/drawing/2014/main" id="{C7C5AEC9-6EE0-FF45-9839-6F1617C7584E}"/>
-              </a:ext>
-            </a:extLst>
-          </p:cNvPr>
-          <p:cNvSpPr>
-            <a:spLocks noGrp="1"/>
-          </p:cNvSpPr>
-          <p:nvPr>
-            <p:ph type="ctrTitle"/>
-          </p:nvPr>
-        </p:nvSpPr>
-        <p:spPr/>
-        <p:txBody>
-          <a:bodyPr/>
-          <a:lstStyle/>
-          <a:p>
-            <a:r>
-              <a:rPr lang="en-US" dirty="0"/>
-              <a:t>Running the Program</a:t>
-            </a:r>
-          </a:p>
-        </p:txBody>
-      </p:sp>
-      <p:sp>
-        <p:nvSpPr>
-          <p:cNvPr id="3" name="Subtitle 2">
-            <a:extLst>
-              <a:ext uri="{FF2B5EF4-FFF2-40B4-BE49-F238E27FC236}">
-                <a16:creationId xmlns:a16="http://schemas.microsoft.com/office/drawing/2014/main" id="{46B26E2D-2C9E-604A-A8CC-062DB52DD6A6}"/>
-              </a:ext>
-            </a:extLst>
-          </p:cNvPr>
-          <p:cNvSpPr>
-            <a:spLocks noGrp="1"/>
-          </p:cNvSpPr>
-          <p:nvPr>
-            <p:ph type="subTitle" idx="1"/>
-          </p:nvPr>
-        </p:nvSpPr>
-        <p:spPr/>
-        <p:txBody>
-          <a:bodyPr/>
-          <a:lstStyle/>
-          <a:p>
-            <a:endParaRPr lang="en-US"/>
-          </a:p>
-        </p:txBody>
-      </p:sp>
-    </p:spTree>
-    <p:extLst>
-      <p:ext uri="{BB962C8B-B14F-4D97-AF65-F5344CB8AC3E}">
-        <p14:creationId xmlns:p14="http://schemas.microsoft.com/office/powerpoint/2010/main" val="2377248946"/>
-      </p:ext>
-    </p:extLst>
-  </p:cSld>
-  <p:clrMapOvr>
-    <a:masterClrMapping/>
-  </p:clrMapOvr>
-</p:sld>
-</file>
-
-<file path=ppt/slides/slide12.xml><?xml version="1.0" encoding="utf-8"?>
-<p:sld xmlns:a="http://schemas.openxmlformats.org/drawingml/2006/main" xmlns:r="http://schemas.openxmlformats.org/officeDocument/2006/relationships" xmlns:p="http://schemas.openxmlformats.org/presentationml/2006/main">
-  <p:cSld>
-    <p:spTree>
-      <p:nvGrpSpPr>
-        <p:cNvPr id="1" name=""/>
-        <p:cNvGrpSpPr/>
-        <p:nvPr/>
-      </p:nvGrpSpPr>
-      <p:grpSpPr>
-        <a:xfrm>
-          <a:off x="0" y="0"/>
-          <a:ext cx="0" cy="0"/>
-          <a:chOff x="0" y="0"/>
-          <a:chExt cx="0" cy="0"/>
-        </a:xfrm>
-      </p:grpSpPr>
-      <p:sp>
-        <p:nvSpPr>
-          <p:cNvPr id="2" name="Title 1">
-            <a:extLst>
-              <a:ext uri="{FF2B5EF4-FFF2-40B4-BE49-F238E27FC236}">
                 <a16:creationId xmlns:a16="http://schemas.microsoft.com/office/drawing/2014/main" id="{BC2B5AC3-611C-5341-AE2F-96E53CBD4FA2}"/>
               </a:ext>
             </a:extLst>
@@ -3691,7 +4196,7 @@
 </p:sld>
 </file>
 
-<file path=ppt/slides/slide13.xml><?xml version="1.0" encoding="utf-8"?>
+<file path=ppt/slides/slide12.xml><?xml version="1.0" encoding="utf-8"?>
 <p:sld xmlns:a="http://schemas.openxmlformats.org/drawingml/2006/main" xmlns:r="http://schemas.openxmlformats.org/officeDocument/2006/relationships" xmlns:p="http://schemas.openxmlformats.org/presentationml/2006/main">
   <p:cSld>
     <p:spTree>
@@ -3867,6 +4372,136 @@
 </p:sld>
 </file>
 
+<file path=ppt/slides/slide13.xml><?xml version="1.0" encoding="utf-8"?>
+<p:sld xmlns:a="http://schemas.openxmlformats.org/drawingml/2006/main" xmlns:r="http://schemas.openxmlformats.org/officeDocument/2006/relationships" xmlns:p="http://schemas.openxmlformats.org/presentationml/2006/main">
+  <p:cSld>
+    <p:spTree>
+      <p:nvGrpSpPr>
+        <p:cNvPr id="1" name=""/>
+        <p:cNvGrpSpPr/>
+        <p:nvPr/>
+      </p:nvGrpSpPr>
+      <p:grpSpPr>
+        <a:xfrm>
+          <a:off x="0" y="0"/>
+          <a:ext cx="0" cy="0"/>
+          <a:chOff x="0" y="0"/>
+          <a:chExt cx="0" cy="0"/>
+        </a:xfrm>
+      </p:grpSpPr>
+      <p:sp>
+        <p:nvSpPr>
+          <p:cNvPr id="2" name="Title 1">
+            <a:extLst>
+              <a:ext uri="{FF2B5EF4-FFF2-40B4-BE49-F238E27FC236}">
+                <a16:creationId xmlns:a16="http://schemas.microsoft.com/office/drawing/2014/main" id="{7333C74D-BA0A-D24F-9A14-6FBC66572294}"/>
+              </a:ext>
+            </a:extLst>
+          </p:cNvPr>
+          <p:cNvSpPr>
+            <a:spLocks noGrp="1"/>
+          </p:cNvSpPr>
+          <p:nvPr>
+            <p:ph type="title"/>
+          </p:nvPr>
+        </p:nvSpPr>
+        <p:spPr/>
+        <p:txBody>
+          <a:bodyPr/>
+          <a:lstStyle/>
+          <a:p>
+            <a:r>
+              <a:rPr lang="en-US" dirty="0"/>
+              <a:t>Running the Program</a:t>
+            </a:r>
+          </a:p>
+        </p:txBody>
+      </p:sp>
+      <p:sp>
+        <p:nvSpPr>
+          <p:cNvPr id="3" name="Content Placeholder 2">
+            <a:extLst>
+              <a:ext uri="{FF2B5EF4-FFF2-40B4-BE49-F238E27FC236}">
+                <a16:creationId xmlns:a16="http://schemas.microsoft.com/office/drawing/2014/main" id="{56909D2C-66FF-9D40-B1FF-A0C78BA945EB}"/>
+              </a:ext>
+            </a:extLst>
+          </p:cNvPr>
+          <p:cNvSpPr>
+            <a:spLocks noGrp="1"/>
+          </p:cNvSpPr>
+          <p:nvPr>
+            <p:ph idx="1"/>
+          </p:nvPr>
+        </p:nvSpPr>
+        <p:spPr/>
+        <p:txBody>
+          <a:bodyPr/>
+          <a:lstStyle/>
+          <a:p>
+            <a:r>
+              <a:rPr lang="en-US" dirty="0"/>
+              <a:t>Basic running can be achieved by following command </a:t>
+            </a:r>
+          </a:p>
+          <a:p>
+            <a:pPr lvl="1"/>
+            <a:r>
+              <a:rPr lang="en-US" dirty="0"/>
+              <a:t>python3 </a:t>
+            </a:r>
+            <a:r>
+              <a:rPr lang="en-US" dirty="0" err="1"/>
+              <a:t>main.py</a:t>
+            </a:r>
+            <a:r>
+              <a:rPr lang="en-US" dirty="0"/>
+              <a:t> –</a:t>
+            </a:r>
+            <a:r>
+              <a:rPr lang="en-US" dirty="0" err="1"/>
+              <a:t>input_file</a:t>
+            </a:r>
+            <a:r>
+              <a:rPr lang="en-US" dirty="0"/>
+              <a:t> &lt;filename&gt; </a:t>
+            </a:r>
+          </a:p>
+          <a:p>
+            <a:r>
+              <a:rPr lang="en-US" dirty="0"/>
+              <a:t>Full list of commands can be found by following command</a:t>
+            </a:r>
+          </a:p>
+          <a:p>
+            <a:pPr lvl="1"/>
+            <a:r>
+              <a:rPr lang="en-US" dirty="0"/>
+              <a:t>python3 </a:t>
+            </a:r>
+            <a:r>
+              <a:rPr lang="en-US" dirty="0" err="1"/>
+              <a:t>main.py</a:t>
+            </a:r>
+            <a:r>
+              <a:rPr lang="en-US" dirty="0"/>
+              <a:t> –h </a:t>
+            </a:r>
+          </a:p>
+        </p:txBody>
+      </p:sp>
+    </p:spTree>
+    <p:extLst>
+      <p:ext uri="{BB962C8B-B14F-4D97-AF65-F5344CB8AC3E}">
+        <p14:creationId xmlns:p14="http://schemas.microsoft.com/office/powerpoint/2010/main" val="2295516186"/>
+      </p:ext>
+    </p:extLst>
+  </p:cSld>
+  <p:clrMapOvr>
+    <a:masterClrMapping/>
+  </p:clrMapOvr>
+</p:sld>
+</file>
+
 <file path=ppt/slides/slide14.xml><?xml version="1.0" encoding="utf-8"?>
 <p:sld xmlns:a="http://schemas.openxmlformats.org/drawingml/2006/main" xmlns:r="http://schemas.openxmlformats.org/officeDocument/2006/relationships" xmlns:p="http://schemas.openxmlformats.org/presentationml/2006/main">
   <p:cSld>
@@ -3889,7 +4524,7 @@
           <p:cNvPr id="2" name="Title 1">
             <a:extLst>
               <a:ext uri="{FF2B5EF4-FFF2-40B4-BE49-F238E27FC236}">
-                <a16:creationId xmlns:a16="http://schemas.microsoft.com/office/drawing/2014/main" id="{7333C74D-BA0A-D24F-9A14-6FBC66572294}"/>
+                <a16:creationId xmlns:a16="http://schemas.microsoft.com/office/drawing/2014/main" id="{EFCB9C9E-48DC-7940-87D1-1CC1D633211A}"/>
               </a:ext>
             </a:extLst>
           </p:cNvPr>
@@ -3907,7 +4542,7 @@
           <a:p>
             <a:r>
               <a:rPr lang="en-US" dirty="0"/>
-              <a:t>Running the Program</a:t>
+              <a:t>Select Parameters</a:t>
             </a:r>
           </a:p>
         </p:txBody>
@@ -3917,7 +4552,7 @@
           <p:cNvPr id="3" name="Content Placeholder 2">
             <a:extLst>
               <a:ext uri="{FF2B5EF4-FFF2-40B4-BE49-F238E27FC236}">
-                <a16:creationId xmlns:a16="http://schemas.microsoft.com/office/drawing/2014/main" id="{56909D2C-66FF-9D40-B1FF-A0C78BA945EB}"/>
+                <a16:creationId xmlns:a16="http://schemas.microsoft.com/office/drawing/2014/main" id="{DDD9A3C0-3A99-5344-85C2-14C1A552B44C}"/>
               </a:ext>
             </a:extLst>
           </p:cNvPr>
@@ -3935,59 +4570,90 @@
           <a:p>
             <a:r>
               <a:rPr lang="en-US" dirty="0"/>
-              <a:t>Basic running can be achieved by following command </a:t>
+              <a:t>--</a:t>
+            </a:r>
+            <a:r>
+              <a:rPr lang="en-US" dirty="0" err="1"/>
+              <a:t>meeting_duration</a:t>
+            </a:r>
+            <a:r>
+              <a:rPr lang="en-US" dirty="0"/>
+              <a:t> (defaults to 75) </a:t>
+            </a:r>
+          </a:p>
+          <a:p>
+            <a:r>
+              <a:rPr lang="en-US" dirty="0"/>
+              <a:t>--</a:t>
+            </a:r>
+            <a:r>
+              <a:rPr lang="en-US" dirty="0" err="1"/>
+              <a:t>sample_size</a:t>
+            </a:r>
+            <a:r>
+              <a:rPr lang="en-US" dirty="0"/>
+              <a:t> </a:t>
             </a:r>
           </a:p>
           <a:p>
             <a:pPr lvl="1"/>
             <a:r>
               <a:rPr lang="en-US" dirty="0"/>
-              <a:t>python3 </a:t>
+              <a:t>The number of chromosomes randomly selected for the next generation (pre-prune stage)</a:t>
+            </a:r>
+          </a:p>
+          <a:p>
+            <a:r>
+              <a:rPr lang="en-US" dirty="0"/>
+              <a:t>--</a:t>
             </a:r>
             <a:r>
               <a:rPr lang="en-US" dirty="0" err="1"/>
-              <a:t>main.py</a:t>
+              <a:t>unmatched_weight</a:t>
             </a:r>
             <a:r>
               <a:rPr lang="en-US" dirty="0"/>
-              <a:t> –</a:t>
+              <a:t>/ --</a:t>
             </a:r>
             <a:r>
               <a:rPr lang="en-US" dirty="0" err="1"/>
-              <a:t>input_file</a:t>
+              <a:t>group_size_weight</a:t>
             </a:r>
             <a:r>
               <a:rPr lang="en-US" dirty="0"/>
-              <a:t> &lt;filename&gt; </a:t>
-            </a:r>
-          </a:p>
-          <a:p>
+              <a:t>/ --</a:t>
+            </a:r>
+            <a:r>
+              <a:rPr lang="en-US" dirty="0" err="1"/>
+              <a:t>num_groups_weight</a:t>
+            </a:r>
             <a:r>
               <a:rPr lang="en-US" dirty="0"/>
-              <a:t>Full list of commands can be found by following command</a:t>
-            </a:r>
+              <a:t>/ --</a:t>
+            </a:r>
+            <a:r>
+              <a:rPr lang="en-US" dirty="0" err="1"/>
+              <a:t>feature_weight</a:t>
+            </a:r>
+            <a:endParaRPr lang="en-US" dirty="0"/>
           </a:p>
           <a:p>
             <a:pPr lvl="1"/>
             <a:r>
               <a:rPr lang="en-US" dirty="0"/>
-              <a:t>python3 </a:t>
-            </a:r>
-            <a:r>
-              <a:rPr lang="en-US" dirty="0" err="1"/>
-              <a:t>main.py</a:t>
-            </a:r>
-            <a:r>
-              <a:rPr lang="en-US" dirty="0"/>
-              <a:t> –h </a:t>
-            </a:r>
+              <a:t>Weights for the 4 parts of the fitness function. Total amongst these arguments must equal 1</a:t>
+            </a:r>
+          </a:p>
+          <a:p>
+            <a:pPr lvl="1"/>
+            <a:endParaRPr lang="en-US" dirty="0"/>
           </a:p>
         </p:txBody>
       </p:sp>
     </p:spTree>
     <p:extLst>
       <p:ext uri="{BB962C8B-B14F-4D97-AF65-F5344CB8AC3E}">
-        <p14:creationId xmlns:p14="http://schemas.microsoft.com/office/powerpoint/2010/main" val="2295516186"/>
+        <p14:creationId xmlns:p14="http://schemas.microsoft.com/office/powerpoint/2010/main" val="2531341144"/>
       </p:ext>
     </p:extLst>
   </p:cSld>
@@ -4019,7 +4685,7 @@
           <p:cNvPr id="2" name="Title 1">
             <a:extLst>
               <a:ext uri="{FF2B5EF4-FFF2-40B4-BE49-F238E27FC236}">
-                <a16:creationId xmlns:a16="http://schemas.microsoft.com/office/drawing/2014/main" id="{EFCB9C9E-48DC-7940-87D1-1CC1D633211A}"/>
+                <a16:creationId xmlns:a16="http://schemas.microsoft.com/office/drawing/2014/main" id="{8E265EAA-B3FB-8642-A1C3-0B9E0BF89106}"/>
               </a:ext>
             </a:extLst>
           </p:cNvPr>
@@ -4037,7 +4703,7 @@
           <a:p>
             <a:r>
               <a:rPr lang="en-US" dirty="0"/>
-              <a:t>Select Parameters</a:t>
+              <a:t>Output</a:t>
             </a:r>
           </a:p>
         </p:txBody>
@@ -4047,7 +4713,7 @@
           <p:cNvPr id="3" name="Content Placeholder 2">
             <a:extLst>
               <a:ext uri="{FF2B5EF4-FFF2-40B4-BE49-F238E27FC236}">
-                <a16:creationId xmlns:a16="http://schemas.microsoft.com/office/drawing/2014/main" id="{DDD9A3C0-3A99-5344-85C2-14C1A552B44C}"/>
+                <a16:creationId xmlns:a16="http://schemas.microsoft.com/office/drawing/2014/main" id="{78CA8D14-D64A-9D4B-8C75-FCB4C51AE45D}"/>
               </a:ext>
             </a:extLst>
           </p:cNvPr>
@@ -4065,90 +4731,46 @@
           <a:p>
             <a:r>
               <a:rPr lang="en-US" dirty="0"/>
-              <a:t>--</a:t>
-            </a:r>
-            <a:r>
-              <a:rPr lang="en-US" dirty="0" err="1"/>
-              <a:t>meeting_duration</a:t>
+              <a:t>Groups file is written to </a:t>
+            </a:r>
+            <a:r>
+              <a:rPr lang="en-US" b="1" dirty="0" err="1"/>
+              <a:t>groups.csv</a:t>
+            </a:r>
+            <a:r>
+              <a:rPr lang="en-US" b="1" dirty="0"/>
+              <a:t> </a:t>
             </a:r>
             <a:r>
               <a:rPr lang="en-US" dirty="0"/>
-              <a:t> (defaults to 75) </a:t>
-            </a:r>
+              <a:t>(can be opened in excel)</a:t>
+            </a:r>
+            <a:endParaRPr lang="en-US" b="1" dirty="0"/>
           </a:p>
           <a:p>
             <a:r>
               <a:rPr lang="en-US" dirty="0"/>
-              <a:t>--</a:t>
-            </a:r>
-            <a:r>
-              <a:rPr lang="en-US" dirty="0" err="1"/>
-              <a:t>sample_size</a:t>
+              <a:t>Unmatched people is written to </a:t>
+            </a:r>
+            <a:r>
+              <a:rPr lang="en-US" b="1" dirty="0" err="1"/>
+              <a:t>unmatched.csv</a:t>
+            </a:r>
+            <a:r>
+              <a:rPr lang="en-US" b="1" dirty="0"/>
+              <a:t> </a:t>
             </a:r>
             <a:r>
               <a:rPr lang="en-US" dirty="0"/>
-              <a:t> </a:t>
-            </a:r>
-          </a:p>
-          <a:p>
-            <a:pPr lvl="1"/>
-            <a:r>
-              <a:rPr lang="en-US" dirty="0"/>
-              <a:t>The number of chromosomes randomly selected for the next generation (pre-prune stage)</a:t>
-            </a:r>
-          </a:p>
-          <a:p>
-            <a:r>
-              <a:rPr lang="en-US" dirty="0"/>
-              <a:t>--</a:t>
-            </a:r>
-            <a:r>
-              <a:rPr lang="en-US" dirty="0" err="1"/>
-              <a:t>unmatched_weight</a:t>
-            </a:r>
-            <a:r>
-              <a:rPr lang="en-US" dirty="0"/>
-              <a:t>/ --</a:t>
-            </a:r>
-            <a:r>
-              <a:rPr lang="en-US" dirty="0" err="1"/>
-              <a:t>group_size_weight</a:t>
-            </a:r>
-            <a:r>
-              <a:rPr lang="en-US" dirty="0"/>
-              <a:t>/ --</a:t>
-            </a:r>
-            <a:r>
-              <a:rPr lang="en-US" dirty="0" err="1"/>
-              <a:t>num_groups_weight</a:t>
-            </a:r>
-            <a:r>
-              <a:rPr lang="en-US" dirty="0"/>
-              <a:t>/ --</a:t>
-            </a:r>
-            <a:r>
-              <a:rPr lang="en-US" dirty="0" err="1"/>
-              <a:t>feature_weight</a:t>
-            </a:r>
-            <a:endParaRPr lang="en-US" dirty="0"/>
-          </a:p>
-          <a:p>
-            <a:pPr lvl="1"/>
-            <a:r>
-              <a:rPr lang="en-US" dirty="0"/>
-              <a:t>Weights for the 4 parts of the fitness function. Total amongst these arguments must equal 1</a:t>
-            </a:r>
-          </a:p>
-          <a:p>
-            <a:pPr lvl="1"/>
-            <a:endParaRPr lang="en-US" dirty="0"/>
+              <a:t>(can be opened in excel)</a:t>
+            </a:r>
           </a:p>
         </p:txBody>
       </p:sp>
     </p:spTree>
     <p:extLst>
       <p:ext uri="{BB962C8B-B14F-4D97-AF65-F5344CB8AC3E}">
-        <p14:creationId xmlns:p14="http://schemas.microsoft.com/office/powerpoint/2010/main" val="2531341144"/>
+        <p14:creationId xmlns:p14="http://schemas.microsoft.com/office/powerpoint/2010/main" val="2943416065"/>
       </p:ext>
     </p:extLst>
   </p:cSld>
@@ -4180,123 +4802,6 @@
           <p:cNvPr id="2" name="Title 1">
             <a:extLst>
               <a:ext uri="{FF2B5EF4-FFF2-40B4-BE49-F238E27FC236}">
-                <a16:creationId xmlns:a16="http://schemas.microsoft.com/office/drawing/2014/main" id="{8E265EAA-B3FB-8642-A1C3-0B9E0BF89106}"/>
-              </a:ext>
-            </a:extLst>
-          </p:cNvPr>
-          <p:cNvSpPr>
-            <a:spLocks noGrp="1"/>
-          </p:cNvSpPr>
-          <p:nvPr>
-            <p:ph type="title"/>
-          </p:nvPr>
-        </p:nvSpPr>
-        <p:spPr/>
-        <p:txBody>
-          <a:bodyPr/>
-          <a:lstStyle/>
-          <a:p>
-            <a:r>
-              <a:rPr lang="en-US" dirty="0"/>
-              <a:t>Output</a:t>
-            </a:r>
-          </a:p>
-        </p:txBody>
-      </p:sp>
-      <p:sp>
-        <p:nvSpPr>
-          <p:cNvPr id="3" name="Content Placeholder 2">
-            <a:extLst>
-              <a:ext uri="{FF2B5EF4-FFF2-40B4-BE49-F238E27FC236}">
-                <a16:creationId xmlns:a16="http://schemas.microsoft.com/office/drawing/2014/main" id="{78CA8D14-D64A-9D4B-8C75-FCB4C51AE45D}"/>
-              </a:ext>
-            </a:extLst>
-          </p:cNvPr>
-          <p:cNvSpPr>
-            <a:spLocks noGrp="1"/>
-          </p:cNvSpPr>
-          <p:nvPr>
-            <p:ph idx="1"/>
-          </p:nvPr>
-        </p:nvSpPr>
-        <p:spPr/>
-        <p:txBody>
-          <a:bodyPr/>
-          <a:lstStyle/>
-          <a:p>
-            <a:r>
-              <a:rPr lang="en-US" dirty="0"/>
-              <a:t>Groups file is written to </a:t>
-            </a:r>
-            <a:r>
-              <a:rPr lang="en-US" b="1" dirty="0" err="1"/>
-              <a:t>groups.csv</a:t>
-            </a:r>
-            <a:r>
-              <a:rPr lang="en-US" b="1" dirty="0"/>
-              <a:t> </a:t>
-            </a:r>
-            <a:r>
-              <a:rPr lang="en-US" dirty="0"/>
-              <a:t>(can be opened in excel)</a:t>
-            </a:r>
-            <a:endParaRPr lang="en-US" b="1" dirty="0"/>
-          </a:p>
-          <a:p>
-            <a:r>
-              <a:rPr lang="en-US" dirty="0"/>
-              <a:t>Unmatched people is written to </a:t>
-            </a:r>
-            <a:r>
-              <a:rPr lang="en-US" b="1" dirty="0" err="1"/>
-              <a:t>unmatched.csv</a:t>
-            </a:r>
-            <a:r>
-              <a:rPr lang="en-US" b="1" dirty="0"/>
-              <a:t> </a:t>
-            </a:r>
-            <a:r>
-              <a:rPr lang="en-US" dirty="0"/>
-              <a:t>(can be opened in excel)</a:t>
-            </a:r>
-          </a:p>
-        </p:txBody>
-      </p:sp>
-    </p:spTree>
-    <p:extLst>
-      <p:ext uri="{BB962C8B-B14F-4D97-AF65-F5344CB8AC3E}">
-        <p14:creationId xmlns:p14="http://schemas.microsoft.com/office/powerpoint/2010/main" val="2943416065"/>
-      </p:ext>
-    </p:extLst>
-  </p:cSld>
-  <p:clrMapOvr>
-    <a:masterClrMapping/>
-  </p:clrMapOvr>
-</p:sld>
-</file>
-
-<file path=ppt/slides/slide17.xml><?xml version="1.0" encoding="utf-8"?>
-<p:sld xmlns:a="http://schemas.openxmlformats.org/drawingml/2006/main" xmlns:r="http://schemas.openxmlformats.org/officeDocument/2006/relationships" xmlns:p="http://schemas.openxmlformats.org/presentationml/2006/main">
-  <p:cSld>
-    <p:spTree>
-      <p:nvGrpSpPr>
-        <p:cNvPr id="1" name=""/>
-        <p:cNvGrpSpPr/>
-        <p:nvPr/>
-      </p:nvGrpSpPr>
-      <p:grpSpPr>
-        <a:xfrm>
-          <a:off x="0" y="0"/>
-          <a:ext cx="0" cy="0"/>
-          <a:chOff x="0" y="0"/>
-          <a:chExt cx="0" cy="0"/>
-        </a:xfrm>
-      </p:grpSpPr>
-      <p:sp>
-        <p:nvSpPr>
-          <p:cNvPr id="2" name="Title 1">
-            <a:extLst>
-              <a:ext uri="{FF2B5EF4-FFF2-40B4-BE49-F238E27FC236}">
                 <a16:creationId xmlns:a16="http://schemas.microsoft.com/office/drawing/2014/main" id="{04B71572-F8D7-3446-AA65-E51EBDAE38CB}"/>
               </a:ext>
             </a:extLst>
@@ -4435,89 +4940,6 @@
 </file>
 
 <file path=ppt/slides/slide2.xml><?xml version="1.0" encoding="utf-8"?>
-<p:sld xmlns:a="http://schemas.openxmlformats.org/drawingml/2006/main" xmlns:r="http://schemas.openxmlformats.org/officeDocument/2006/relationships" xmlns:p="http://schemas.openxmlformats.org/presentationml/2006/main">
-  <p:cSld>
-    <p:spTree>
-      <p:nvGrpSpPr>
-        <p:cNvPr id="1" name=""/>
-        <p:cNvGrpSpPr/>
-        <p:nvPr/>
-      </p:nvGrpSpPr>
-      <p:grpSpPr>
-        <a:xfrm>
-          <a:off x="0" y="0"/>
-          <a:ext cx="0" cy="0"/>
-          <a:chOff x="0" y="0"/>
-          <a:chExt cx="0" cy="0"/>
-        </a:xfrm>
-      </p:grpSpPr>
-      <p:sp>
-        <p:nvSpPr>
-          <p:cNvPr id="2" name="Title 1">
-            <a:extLst>
-              <a:ext uri="{FF2B5EF4-FFF2-40B4-BE49-F238E27FC236}">
-                <a16:creationId xmlns:a16="http://schemas.microsoft.com/office/drawing/2014/main" id="{C7C5AEC9-6EE0-FF45-9839-6F1617C7584E}"/>
-              </a:ext>
-            </a:extLst>
-          </p:cNvPr>
-          <p:cNvSpPr>
-            <a:spLocks noGrp="1"/>
-          </p:cNvSpPr>
-          <p:nvPr>
-            <p:ph type="ctrTitle"/>
-          </p:nvPr>
-        </p:nvSpPr>
-        <p:spPr/>
-        <p:txBody>
-          <a:bodyPr/>
-          <a:lstStyle/>
-          <a:p>
-            <a:r>
-              <a:rPr lang="en-US" dirty="0"/>
-              <a:t>Algorithm Overview</a:t>
-            </a:r>
-          </a:p>
-        </p:txBody>
-      </p:sp>
-      <p:sp>
-        <p:nvSpPr>
-          <p:cNvPr id="3" name="Subtitle 2">
-            <a:extLst>
-              <a:ext uri="{FF2B5EF4-FFF2-40B4-BE49-F238E27FC236}">
-                <a16:creationId xmlns:a16="http://schemas.microsoft.com/office/drawing/2014/main" id="{46B26E2D-2C9E-604A-A8CC-062DB52DD6A6}"/>
-              </a:ext>
-            </a:extLst>
-          </p:cNvPr>
-          <p:cNvSpPr>
-            <a:spLocks noGrp="1"/>
-          </p:cNvSpPr>
-          <p:nvPr>
-            <p:ph type="subTitle" idx="1"/>
-          </p:nvPr>
-        </p:nvSpPr>
-        <p:spPr/>
-        <p:txBody>
-          <a:bodyPr/>
-          <a:lstStyle/>
-          <a:p>
-            <a:endParaRPr lang="en-US"/>
-          </a:p>
-        </p:txBody>
-      </p:sp>
-    </p:spTree>
-    <p:extLst>
-      <p:ext uri="{BB962C8B-B14F-4D97-AF65-F5344CB8AC3E}">
-        <p14:creationId xmlns:p14="http://schemas.microsoft.com/office/powerpoint/2010/main" val="492255810"/>
-      </p:ext>
-    </p:extLst>
-  </p:cSld>
-  <p:clrMapOvr>
-    <a:masterClrMapping/>
-  </p:clrMapOvr>
-</p:sld>
-</file>
-
-<file path=ppt/slides/slide3.xml><?xml version="1.0" encoding="utf-8"?>
 <p:sld xmlns:a="http://schemas.openxmlformats.org/drawingml/2006/main" xmlns:r="http://schemas.openxmlformats.org/officeDocument/2006/relationships" xmlns:p="http://schemas.openxmlformats.org/presentationml/2006/main">
   <p:cSld>
     <p:spTree>
@@ -4842,6 +5264,108 @@
 </p:sld>
 </file>
 
+<file path=ppt/slides/slide3.xml><?xml version="1.0" encoding="utf-8"?>
+<p:sld xmlns:a="http://schemas.openxmlformats.org/drawingml/2006/main" xmlns:r="http://schemas.openxmlformats.org/officeDocument/2006/relationships" xmlns:p="http://schemas.openxmlformats.org/presentationml/2006/main">
+  <p:cSld>
+    <p:spTree>
+      <p:nvGrpSpPr>
+        <p:cNvPr id="1" name=""/>
+        <p:cNvGrpSpPr/>
+        <p:nvPr/>
+      </p:nvGrpSpPr>
+      <p:grpSpPr>
+        <a:xfrm>
+          <a:off x="0" y="0"/>
+          <a:ext cx="0" cy="0"/>
+          <a:chOff x="0" y="0"/>
+          <a:chExt cx="0" cy="0"/>
+        </a:xfrm>
+      </p:grpSpPr>
+      <p:sp>
+        <p:nvSpPr>
+          <p:cNvPr id="2" name="Title 1">
+            <a:extLst>
+              <a:ext uri="{FF2B5EF4-FFF2-40B4-BE49-F238E27FC236}">
+                <a16:creationId xmlns:a16="http://schemas.microsoft.com/office/drawing/2014/main" id="{2B36AAF6-C88F-7B41-8C89-F6894E194305}"/>
+              </a:ext>
+            </a:extLst>
+          </p:cNvPr>
+          <p:cNvSpPr>
+            <a:spLocks noGrp="1"/>
+          </p:cNvSpPr>
+          <p:nvPr>
+            <p:ph type="title"/>
+          </p:nvPr>
+        </p:nvSpPr>
+        <p:spPr/>
+        <p:txBody>
+          <a:bodyPr/>
+          <a:lstStyle/>
+          <a:p>
+            <a:r>
+              <a:rPr lang="en-US" dirty="0"/>
+              <a:t>Proposed Solution: Genetic Algorithm</a:t>
+            </a:r>
+          </a:p>
+        </p:txBody>
+      </p:sp>
+      <p:sp>
+        <p:nvSpPr>
+          <p:cNvPr id="3" name="Content Placeholder 2">
+            <a:extLst>
+              <a:ext uri="{FF2B5EF4-FFF2-40B4-BE49-F238E27FC236}">
+                <a16:creationId xmlns:a16="http://schemas.microsoft.com/office/drawing/2014/main" id="{C0D99065-9B6F-2A47-8FF3-B2D2183864EB}"/>
+              </a:ext>
+            </a:extLst>
+          </p:cNvPr>
+          <p:cNvSpPr>
+            <a:spLocks noGrp="1"/>
+          </p:cNvSpPr>
+          <p:nvPr>
+            <p:ph idx="1"/>
+          </p:nvPr>
+        </p:nvSpPr>
+        <p:spPr/>
+        <p:txBody>
+          <a:bodyPr/>
+          <a:lstStyle/>
+          <a:p>
+            <a:r>
+              <a:rPr lang="en-US" dirty="0"/>
+              <a:t>Heuristic approach to cut down search space</a:t>
+            </a:r>
+          </a:p>
+          <a:p>
+            <a:r>
+              <a:rPr lang="en-US" dirty="0"/>
+              <a:t>Based off Darwin’s theory of evolution </a:t>
+            </a:r>
+          </a:p>
+          <a:p>
+            <a:r>
+              <a:rPr lang="en-US" dirty="0"/>
+              <a:t>Each Generation is trying to maximize a </a:t>
+            </a:r>
+            <a:r>
+              <a:rPr lang="en-US" b="1" dirty="0"/>
+              <a:t>fitness function</a:t>
+            </a:r>
+          </a:p>
+        </p:txBody>
+      </p:sp>
+    </p:spTree>
+    <p:extLst>
+      <p:ext uri="{BB962C8B-B14F-4D97-AF65-F5344CB8AC3E}">
+        <p14:creationId xmlns:p14="http://schemas.microsoft.com/office/powerpoint/2010/main" val="2185610006"/>
+      </p:ext>
+    </p:extLst>
+  </p:cSld>
+  <p:clrMapOvr>
+    <a:masterClrMapping/>
+  </p:clrMapOvr>
+</p:sld>
+</file>
+
 <file path=ppt/slides/slide4.xml><?xml version="1.0" encoding="utf-8"?>
 <p:sld xmlns:a="http://schemas.openxmlformats.org/drawingml/2006/main" xmlns:r="http://schemas.openxmlformats.org/officeDocument/2006/relationships" xmlns:p="http://schemas.openxmlformats.org/presentationml/2006/main">
   <p:cSld>
@@ -4864,108 +5388,6 @@
           <p:cNvPr id="2" name="Title 1">
             <a:extLst>
               <a:ext uri="{FF2B5EF4-FFF2-40B4-BE49-F238E27FC236}">
-                <a16:creationId xmlns:a16="http://schemas.microsoft.com/office/drawing/2014/main" id="{2B36AAF6-C88F-7B41-8C89-F6894E194305}"/>
-              </a:ext>
-            </a:extLst>
-          </p:cNvPr>
-          <p:cNvSpPr>
-            <a:spLocks noGrp="1"/>
-          </p:cNvSpPr>
-          <p:nvPr>
-            <p:ph type="title"/>
-          </p:nvPr>
-        </p:nvSpPr>
-        <p:spPr/>
-        <p:txBody>
-          <a:bodyPr/>
-          <a:lstStyle/>
-          <a:p>
-            <a:r>
-              <a:rPr lang="en-US" dirty="0"/>
-              <a:t>Proposed Solution: Genetic Algorithm</a:t>
-            </a:r>
-          </a:p>
-        </p:txBody>
-      </p:sp>
-      <p:sp>
-        <p:nvSpPr>
-          <p:cNvPr id="3" name="Content Placeholder 2">
-            <a:extLst>
-              <a:ext uri="{FF2B5EF4-FFF2-40B4-BE49-F238E27FC236}">
-                <a16:creationId xmlns:a16="http://schemas.microsoft.com/office/drawing/2014/main" id="{C0D99065-9B6F-2A47-8FF3-B2D2183864EB}"/>
-              </a:ext>
-            </a:extLst>
-          </p:cNvPr>
-          <p:cNvSpPr>
-            <a:spLocks noGrp="1"/>
-          </p:cNvSpPr>
-          <p:nvPr>
-            <p:ph idx="1"/>
-          </p:nvPr>
-        </p:nvSpPr>
-        <p:spPr/>
-        <p:txBody>
-          <a:bodyPr/>
-          <a:lstStyle/>
-          <a:p>
-            <a:r>
-              <a:rPr lang="en-US" dirty="0"/>
-              <a:t>Heuristic approach to cut down search space</a:t>
-            </a:r>
-          </a:p>
-          <a:p>
-            <a:r>
-              <a:rPr lang="en-US" dirty="0"/>
-              <a:t>Based off Darwin’s theory of evolution </a:t>
-            </a:r>
-          </a:p>
-          <a:p>
-            <a:r>
-              <a:rPr lang="en-US" dirty="0"/>
-              <a:t>Each Generation is trying to maximize a </a:t>
-            </a:r>
-            <a:r>
-              <a:rPr lang="en-US" b="1" dirty="0"/>
-              <a:t>fitness function</a:t>
-            </a:r>
-          </a:p>
-        </p:txBody>
-      </p:sp>
-    </p:spTree>
-    <p:extLst>
-      <p:ext uri="{BB962C8B-B14F-4D97-AF65-F5344CB8AC3E}">
-        <p14:creationId xmlns:p14="http://schemas.microsoft.com/office/powerpoint/2010/main" val="2185610006"/>
-      </p:ext>
-    </p:extLst>
-  </p:cSld>
-  <p:clrMapOvr>
-    <a:masterClrMapping/>
-  </p:clrMapOvr>
-</p:sld>
-</file>
-
-<file path=ppt/slides/slide5.xml><?xml version="1.0" encoding="utf-8"?>
-<p:sld xmlns:a="http://schemas.openxmlformats.org/drawingml/2006/main" xmlns:r="http://schemas.openxmlformats.org/officeDocument/2006/relationships" xmlns:p="http://schemas.openxmlformats.org/presentationml/2006/main">
-  <p:cSld>
-    <p:spTree>
-      <p:nvGrpSpPr>
-        <p:cNvPr id="1" name=""/>
-        <p:cNvGrpSpPr/>
-        <p:nvPr/>
-      </p:nvGrpSpPr>
-      <p:grpSpPr>
-        <a:xfrm>
-          <a:off x="0" y="0"/>
-          <a:ext cx="0" cy="0"/>
-          <a:chOff x="0" y="0"/>
-          <a:chExt cx="0" cy="0"/>
-        </a:xfrm>
-      </p:grpSpPr>
-      <p:sp>
-        <p:nvSpPr>
-          <p:cNvPr id="2" name="Title 1">
-            <a:extLst>
-              <a:ext uri="{FF2B5EF4-FFF2-40B4-BE49-F238E27FC236}">
                 <a16:creationId xmlns:a16="http://schemas.microsoft.com/office/drawing/2014/main" id="{C75EF68D-DA4C-3E4C-9520-AB48C07A9D09}"/>
               </a:ext>
             </a:extLst>
@@ -5049,79 +5471,6 @@
           </a:p>
           <a:p>
             <a:endParaRPr lang="en-US" dirty="0"/>
-          </a:p>
-        </p:txBody>
-      </p:sp>
-      <p:pic>
-        <p:nvPicPr>
-          <p:cNvPr id="4" name="Picture 3">
-            <a:extLst>
-              <a:ext uri="{FF2B5EF4-FFF2-40B4-BE49-F238E27FC236}">
-                <a16:creationId xmlns:a16="http://schemas.microsoft.com/office/drawing/2014/main" id="{65C854FC-9EF8-B64A-8B72-2BD143344A8E}"/>
-              </a:ext>
-            </a:extLst>
-          </p:cNvPr>
-          <p:cNvPicPr>
-            <a:picLocks noChangeAspect="1"/>
-          </p:cNvPicPr>
-          <p:nvPr/>
-        </p:nvPicPr>
-        <p:blipFill>
-          <a:blip r:embed="rId2"/>
-          <a:stretch>
-            <a:fillRect/>
-          </a:stretch>
-        </p:blipFill>
-        <p:spPr>
-          <a:xfrm>
-            <a:off x="7463971" y="2222045"/>
-            <a:ext cx="4270829" cy="4270829"/>
-          </a:xfrm>
-          <a:prstGeom prst="rect">
-            <a:avLst/>
-          </a:prstGeom>
-        </p:spPr>
-      </p:pic>
-      <p:sp>
-        <p:nvSpPr>
-          <p:cNvPr id="5" name="TextBox 4">
-            <a:extLst>
-              <a:ext uri="{FF2B5EF4-FFF2-40B4-BE49-F238E27FC236}">
-                <a16:creationId xmlns:a16="http://schemas.microsoft.com/office/drawing/2014/main" id="{7FA575CA-CBAE-104B-896E-8B15D39E8044}"/>
-              </a:ext>
-            </a:extLst>
-          </p:cNvPr>
-          <p:cNvSpPr txBox="1"/>
-          <p:nvPr/>
-        </p:nvSpPr>
-        <p:spPr>
-          <a:xfrm>
-            <a:off x="6923315" y="6211669"/>
-            <a:ext cx="4974771" cy="646331"/>
-          </a:xfrm>
-          <a:prstGeom prst="rect">
-            <a:avLst/>
-          </a:prstGeom>
-          <a:noFill/>
-        </p:spPr>
-        <p:txBody>
-          <a:bodyPr wrap="square" rtlCol="0">
-            <a:spAutoFit/>
-          </a:bodyPr>
-          <a:lstStyle/>
-          <a:p>
-            <a:r>
-              <a:rPr lang="en-US" sz="1200" dirty="0"/>
-              <a:t>https://</a:t>
-            </a:r>
-            <a:r>
-              <a:rPr lang="en-US" sz="1200" dirty="0" err="1"/>
-              <a:t>www.khanacademy.org</a:t>
-            </a:r>
-            <a:r>
-              <a:rPr lang="en-US" sz="1200" dirty="0"/>
-              <a:t>/math/algebra/x2f8bb11595b61c86:absolute-value-piecewise-functions/x2f8bb11595b61c86:graphs-of-absolute-value-functions/a/absolute-value-equations-and-graphs-review</a:t>
-            </a:r>
           </a:p>
         </p:txBody>
       </p:sp>
@@ -5138,7 +5487,7 @@
 </p:sld>
 </file>
 
-<file path=ppt/slides/slide6.xml><?xml version="1.0" encoding="utf-8"?>
+<file path=ppt/slides/slide5.xml><?xml version="1.0" encoding="utf-8"?>
 <p:sld xmlns:a="http://schemas.openxmlformats.org/drawingml/2006/main" xmlns:r="http://schemas.openxmlformats.org/officeDocument/2006/relationships" xmlns:p="http://schemas.openxmlformats.org/presentationml/2006/main">
   <p:cSld>
     <p:spTree>
@@ -5802,7 +6151,7 @@
 </p:sld>
 </file>
 
-<file path=ppt/slides/slide7.xml><?xml version="1.0" encoding="utf-8"?>
+<file path=ppt/slides/slide6.xml><?xml version="1.0" encoding="utf-8"?>
 <p:sld xmlns:a="http://schemas.openxmlformats.org/drawingml/2006/main" xmlns:r="http://schemas.openxmlformats.org/officeDocument/2006/relationships" xmlns:p="http://schemas.openxmlformats.org/presentationml/2006/main">
   <p:cSld>
     <p:spTree>
@@ -6469,7 +6818,7 @@
 </p:sld>
 </file>
 
-<file path=ppt/slides/slide8.xml><?xml version="1.0" encoding="utf-8"?>
+<file path=ppt/slides/slide7.xml><?xml version="1.0" encoding="utf-8"?>
 <p:sld xmlns:a="http://schemas.openxmlformats.org/drawingml/2006/main" xmlns:r="http://schemas.openxmlformats.org/officeDocument/2006/relationships" xmlns:p="http://schemas.openxmlformats.org/presentationml/2006/main">
   <p:cSld>
     <p:spTree>
@@ -7385,6 +7734,112 @@
 </p:sld>
 </file>
 
+<file path=ppt/slides/slide8.xml><?xml version="1.0" encoding="utf-8"?>
+<p:sld xmlns:a="http://schemas.openxmlformats.org/drawingml/2006/main" xmlns:r="http://schemas.openxmlformats.org/officeDocument/2006/relationships" xmlns:p="http://schemas.openxmlformats.org/presentationml/2006/main">
+  <p:cSld>
+    <p:spTree>
+      <p:nvGrpSpPr>
+        <p:cNvPr id="1" name=""/>
+        <p:cNvGrpSpPr/>
+        <p:nvPr/>
+      </p:nvGrpSpPr>
+      <p:grpSpPr>
+        <a:xfrm>
+          <a:off x="0" y="0"/>
+          <a:ext cx="0" cy="0"/>
+          <a:chOff x="0" y="0"/>
+          <a:chExt cx="0" cy="0"/>
+        </a:xfrm>
+      </p:grpSpPr>
+      <p:sp>
+        <p:nvSpPr>
+          <p:cNvPr id="2" name="Title 1">
+            <a:extLst>
+              <a:ext uri="{FF2B5EF4-FFF2-40B4-BE49-F238E27FC236}">
+                <a16:creationId xmlns:a16="http://schemas.microsoft.com/office/drawing/2014/main" id="{3155B0A4-6E64-424D-AF74-FED88A577F30}"/>
+              </a:ext>
+            </a:extLst>
+          </p:cNvPr>
+          <p:cNvSpPr>
+            <a:spLocks noGrp="1"/>
+          </p:cNvSpPr>
+          <p:nvPr>
+            <p:ph type="title"/>
+          </p:nvPr>
+        </p:nvSpPr>
+        <p:spPr/>
+        <p:txBody>
+          <a:bodyPr/>
+          <a:lstStyle/>
+          <a:p>
+            <a:r>
+              <a:rPr lang="en-US" dirty="0"/>
+              <a:t>Bad News </a:t>
+            </a:r>
+            <a:r>
+              <a:rPr lang="en-US" dirty="0">
+                <a:sym typeface="Wingdings" pitchFamily="2" charset="2"/>
+              </a:rPr>
+              <a:t></a:t>
+            </a:r>
+            <a:endParaRPr lang="en-US" dirty="0"/>
+          </a:p>
+        </p:txBody>
+      </p:sp>
+      <p:sp>
+        <p:nvSpPr>
+          <p:cNvPr id="3" name="Content Placeholder 2">
+            <a:extLst>
+              <a:ext uri="{FF2B5EF4-FFF2-40B4-BE49-F238E27FC236}">
+                <a16:creationId xmlns:a16="http://schemas.microsoft.com/office/drawing/2014/main" id="{2F3FD5A1-F7FC-B449-9298-BE11FB901EBB}"/>
+              </a:ext>
+            </a:extLst>
+          </p:cNvPr>
+          <p:cNvSpPr>
+            <a:spLocks noGrp="1"/>
+          </p:cNvSpPr>
+          <p:nvPr>
+            <p:ph idx="1"/>
+          </p:nvPr>
+        </p:nvSpPr>
+        <p:spPr/>
+        <p:txBody>
+          <a:bodyPr/>
+          <a:lstStyle/>
+          <a:p>
+            <a:r>
+              <a:rPr lang="en-US" dirty="0"/>
+              <a:t>The optimal solution is not guaranteed </a:t>
+            </a:r>
+          </a:p>
+          <a:p>
+            <a:pPr lvl="1"/>
+            <a:r>
+              <a:rPr lang="en-US" dirty="0"/>
+              <a:t>Accuracy is traded for speed </a:t>
+            </a:r>
+          </a:p>
+          <a:p>
+            <a:r>
+              <a:rPr lang="en-US" dirty="0"/>
+              <a:t>The optimal weights for the fitness function will change with the dataset and parameters</a:t>
+            </a:r>
+          </a:p>
+        </p:txBody>
+      </p:sp>
+    </p:spTree>
+    <p:extLst>
+      <p:ext uri="{BB962C8B-B14F-4D97-AF65-F5344CB8AC3E}">
+        <p14:creationId xmlns:p14="http://schemas.microsoft.com/office/powerpoint/2010/main" val="3212492696"/>
+      </p:ext>
+    </p:extLst>
+  </p:cSld>
+  <p:clrMapOvr>
+    <a:masterClrMapping/>
+  </p:clrMapOvr>
+</p:sld>
+</file>
+
 <file path=ppt/slides/slide9.xml><?xml version="1.0" encoding="utf-8"?>
 <p:sld xmlns:a="http://schemas.openxmlformats.org/drawingml/2006/main" xmlns:r="http://schemas.openxmlformats.org/officeDocument/2006/relationships" xmlns:p="http://schemas.openxmlformats.org/presentationml/2006/main">
   <p:cSld>
@@ -7407,7 +7862,7 @@
           <p:cNvPr id="2" name="Title 1">
             <a:extLst>
               <a:ext uri="{FF2B5EF4-FFF2-40B4-BE49-F238E27FC236}">
-                <a16:creationId xmlns:a16="http://schemas.microsoft.com/office/drawing/2014/main" id="{3155B0A4-6E64-424D-AF74-FED88A577F30}"/>
+                <a16:creationId xmlns:a16="http://schemas.microsoft.com/office/drawing/2014/main" id="{9947412D-25F5-B14C-9019-019C5C901ACB}"/>
               </a:ext>
             </a:extLst>
           </p:cNvPr>
@@ -7425,15 +7880,8 @@
           <a:p>
             <a:r>
               <a:rPr lang="en-US" dirty="0"/>
-              <a:t>Bad News </a:t>
-            </a:r>
-            <a:r>
-              <a:rPr lang="en-US" dirty="0">
-                <a:sym typeface="Wingdings" pitchFamily="2" charset="2"/>
-              </a:rPr>
-              <a:t></a:t>
-            </a:r>
-            <a:endParaRPr lang="en-US" dirty="0"/>
+              <a:t>Good News :D</a:t>
+            </a:r>
           </a:p>
         </p:txBody>
       </p:sp>
@@ -7442,7 +7890,7 @@
           <p:cNvPr id="3" name="Content Placeholder 2">
             <a:extLst>
               <a:ext uri="{FF2B5EF4-FFF2-40B4-BE49-F238E27FC236}">
-                <a16:creationId xmlns:a16="http://schemas.microsoft.com/office/drawing/2014/main" id="{2F3FD5A1-F7FC-B449-9298-BE11FB901EBB}"/>
+                <a16:creationId xmlns:a16="http://schemas.microsoft.com/office/drawing/2014/main" id="{7E65FC7F-D1D1-CB45-8B82-9BF8700F75EF}"/>
               </a:ext>
             </a:extLst>
           </p:cNvPr>
@@ -7460,40 +7908,33 @@
           <a:p>
             <a:r>
               <a:rPr lang="en-US" dirty="0"/>
-              <a:t>The optimal solution is not guaranteed </a:t>
-            </a:r>
-          </a:p>
-          <a:p>
-            <a:pPr lvl="1"/>
+              <a:t>A “pretty good” solution is found</a:t>
+            </a:r>
+          </a:p>
+          <a:p>
             <a:r>
               <a:rPr lang="en-US" dirty="0"/>
-              <a:t>Accuracy is traded for speed </a:t>
+              <a:t>Much much faster than exponential time (polynomial time instead of exponential) </a:t>
             </a:r>
           </a:p>
           <a:p>
             <a:r>
               <a:rPr lang="en-US" dirty="0"/>
-              <a:t>The optimal weights for the fitness function will change with the dataset and parameters</a:t>
+              <a:t>Parameters and arguments are customizable </a:t>
             </a:r>
           </a:p>
           <a:p>
             <a:r>
               <a:rPr lang="en-US" dirty="0"/>
-              <a:t>Program does not match 100% of input people</a:t>
-            </a:r>
-          </a:p>
-          <a:p>
-            <a:pPr marL="0" indent="0">
-              <a:buNone/>
-            </a:pPr>
-            <a:endParaRPr lang="en-US" dirty="0"/>
+              <a:t>Group generated from the program are guaranteed to be accurate</a:t>
+            </a:r>
           </a:p>
         </p:txBody>
       </p:sp>
     </p:spTree>
     <p:extLst>
       <p:ext uri="{BB962C8B-B14F-4D97-AF65-F5344CB8AC3E}">
-        <p14:creationId xmlns:p14="http://schemas.microsoft.com/office/powerpoint/2010/main" val="3212492696"/>
+        <p14:creationId xmlns:p14="http://schemas.microsoft.com/office/powerpoint/2010/main" val="560373099"/>
       </p:ext>
     </p:extLst>
   </p:cSld>
@@ -7796,4 +8237,299 @@
     </a:ext>
   </a:extLst>
 </a:theme>
+</file>
+
+<file path=ppt/theme/theme2.xml><?xml version="1.0" encoding="utf-8"?>
+<a:theme xmlns:a="http://schemas.openxmlformats.org/drawingml/2006/main" name="Office Theme">
+  <a:themeElements>
+    <a:clrScheme name="Office">
+      <a:dk1>
+        <a:sysClr val="windowText" lastClr="000000"/>
+      </a:dk1>
+      <a:lt1>
+        <a:sysClr val="window" lastClr="FFFFFF"/>
+      </a:lt1>
+      <a:dk2>
+        <a:srgbClr val="44546A"/>
+      </a:dk2>
+      <a:lt2>
+        <a:srgbClr val="E7E6E6"/>
+      </a:lt2>
+      <a:accent1>
+        <a:srgbClr val="4472C4"/>
+      </a:accent1>
+      <a:accent2>
+        <a:srgbClr val="ED7D31"/>
+      </a:accent2>
+      <a:accent3>
+        <a:srgbClr val="A5A5A5"/>
+      </a:accent3>
+      <a:accent4>
+        <a:srgbClr val="FFC000"/>
+      </a:accent4>
+      <a:accent5>
+        <a:srgbClr val="5B9BD5"/>
+      </a:accent5>
+      <a:accent6>
+        <a:srgbClr val="70AD47"/>
+      </a:accent6>
+      <a:hlink>
+        <a:srgbClr val="0563C1"/>
+      </a:hlink>
+      <a:folHlink>
+        <a:srgbClr val="954F72"/>
+      </a:folHlink>
+    </a:clrScheme>
+    <a:fontScheme name="Office">
+      <a:majorFont>
+        <a:latin typeface="Calibri Light" panose="020F0302020204030204"/>
+        <a:ea typeface=""/>
+        <a:cs typeface=""/>
+        <a:font script="Jpan" typeface="游ゴシック Light"/>
+        <a:font script="Hang" typeface="맑은 고딕"/>
+        <a:font script="Hans" typeface="等线 Light"/>
+        <a:font script="Hant" typeface="新細明體"/>
+        <a:font script="Arab" typeface="Times New Roman"/>
+        <a:font script="Hebr" typeface="Times New Roman"/>
+        <a:font script="Thai" typeface="Angsana New"/>
+        <a:font script="Ethi" typeface="Nyala"/>
+        <a:font script="Beng" typeface="Vrinda"/>
+        <a:font script="Gujr" typeface="Shruti"/>
+        <a:font script="Khmr" typeface="MoolBoran"/>
+        <a:font script="Knda" typeface="Tunga"/>
+        <a:font script="Guru" typeface="Raavi"/>
+        <a:font script="Cans" typeface="Euphemia"/>
+        <a:font script="Cher" typeface="Plantagenet Cherokee"/>
+        <a:font script="Yiii" typeface="Microsoft Yi Baiti"/>
+        <a:font script="Tibt" typeface="Microsoft Himalaya"/>
+        <a:font script="Thaa" typeface="MV Boli"/>
+        <a:font script="Deva" typeface="Mangal"/>
+        <a:font script="Telu" typeface="Gautami"/>
+        <a:font script="Taml" typeface="Latha"/>
+        <a:font script="Syrc" typeface="Estrangelo Edessa"/>
+        <a:font script="Orya" typeface="Kalinga"/>
+        <a:font script="Mlym" typeface="Kartika"/>
+        <a:font script="Laoo" typeface="DokChampa"/>
+        <a:font script="Sinh" typeface="Iskoola Pota"/>
+        <a:font script="Mong" typeface="Mongolian Baiti"/>
+        <a:font script="Viet" typeface="Times New Roman"/>
+        <a:font script="Uigh" typeface="Microsoft Uighur"/>
+        <a:font script="Geor" typeface="Sylfaen"/>
+        <a:font script="Armn" typeface="Arial"/>
+        <a:font script="Bugi" typeface="Leelawadee UI"/>
+        <a:font script="Bopo" typeface="Microsoft JhengHei"/>
+        <a:font script="Java" typeface="Javanese Text"/>
+        <a:font script="Lisu" typeface="Segoe UI"/>
+        <a:font script="Mymr" typeface="Myanmar Text"/>
+        <a:font script="Nkoo" typeface="Ebrima"/>
+        <a:font script="Olck" typeface="Nirmala UI"/>
+        <a:font script="Osma" typeface="Ebrima"/>
+        <a:font script="Phag" typeface="Phagspa"/>
+        <a:font script="Syrn" typeface="Estrangelo Edessa"/>
+        <a:font script="Syrj" typeface="Estrangelo Edessa"/>
+        <a:font script="Syre" typeface="Estrangelo Edessa"/>
+        <a:font script="Sora" typeface="Nirmala UI"/>
+        <a:font script="Tale" typeface="Microsoft Tai Le"/>
+        <a:font script="Talu" typeface="Microsoft New Tai Lue"/>
+        <a:font script="Tfng" typeface="Ebrima"/>
+      </a:majorFont>
+      <a:minorFont>
+        <a:latin typeface="Calibri" panose="020F0502020204030204"/>
+        <a:ea typeface=""/>
+        <a:cs typeface=""/>
+        <a:font script="Jpan" typeface="游ゴシック"/>
+        <a:font script="Hang" typeface="맑은 고딕"/>
+        <a:font script="Hans" typeface="等线"/>
+        <a:font script="Hant" typeface="新細明體"/>
+        <a:font script="Arab" typeface="Arial"/>
+        <a:font script="Hebr" typeface="Arial"/>
+        <a:font script="Thai" typeface="Cordia New"/>
+        <a:font script="Ethi" typeface="Nyala"/>
+        <a:font script="Beng" typeface="Vrinda"/>
+        <a:font script="Gujr" typeface="Shruti"/>
+        <a:font script="Khmr" typeface="DaunPenh"/>
+        <a:font script="Knda" typeface="Tunga"/>
+        <a:font script="Guru" typeface="Raavi"/>
+        <a:font script="Cans" typeface="Euphemia"/>
+        <a:font script="Cher" typeface="Plantagenet Cherokee"/>
+        <a:font script="Yiii" typeface="Microsoft Yi Baiti"/>
+        <a:font script="Tibt" typeface="Microsoft Himalaya"/>
+        <a:font script="Thaa" typeface="MV Boli"/>
+        <a:font script="Deva" typeface="Mangal"/>
+        <a:font script="Telu" typeface="Gautami"/>
+        <a:font script="Taml" typeface="Latha"/>
+        <a:font script="Syrc" typeface="Estrangelo Edessa"/>
+        <a:font script="Orya" typeface="Kalinga"/>
+        <a:font script="Mlym" typeface="Kartika"/>
+        <a:font script="Laoo" typeface="DokChampa"/>
+        <a:font script="Sinh" typeface="Iskoola Pota"/>
+        <a:font script="Mong" typeface="Mongolian Baiti"/>
+        <a:font script="Viet" typeface="Arial"/>
+        <a:font script="Uigh" typeface="Microsoft Uighur"/>
+        <a:font script="Geor" typeface="Sylfaen"/>
+        <a:font script="Armn" typeface="Arial"/>
+        <a:font script="Bugi" typeface="Leelawadee UI"/>
+        <a:font script="Bopo" typeface="Microsoft JhengHei"/>
+        <a:font script="Java" typeface="Javanese Text"/>
+        <a:font script="Lisu" typeface="Segoe UI"/>
+        <a:font script="Mymr" typeface="Myanmar Text"/>
+        <a:font script="Nkoo" typeface="Ebrima"/>
+        <a:font script="Olck" typeface="Nirmala UI"/>
+        <a:font script="Osma" typeface="Ebrima"/>
+        <a:font script="Phag" typeface="Phagspa"/>
+        <a:font script="Syrn" typeface="Estrangelo Edessa"/>
+        <a:font script="Syrj" typeface="Estrangelo Edessa"/>
+        <a:font script="Syre" typeface="Estrangelo Edessa"/>
+        <a:font script="Sora" typeface="Nirmala UI"/>
+        <a:font script="Tale" typeface="Microsoft Tai Le"/>
+        <a:font script="Talu" typeface="Microsoft New Tai Lue"/>
+        <a:font script="Tfng" typeface="Ebrima"/>
+      </a:minorFont>
+    </a:fontScheme>
+    <a:fmtScheme name="Office">
+      <a:fillStyleLst>
+        <a:solidFill>
+          <a:schemeClr val="phClr"/>
+        </a:solidFill>
+        <a:gradFill rotWithShape="1">
+          <a:gsLst>
+            <a:gs pos="0">
+              <a:schemeClr val="phClr">
+                <a:lumMod val="110000"/>
+                <a:satMod val="105000"/>
+                <a:tint val="67000"/>
+              </a:schemeClr>
+            </a:gs>
+            <a:gs pos="50000">
+              <a:schemeClr val="phClr">
+                <a:lumMod val="105000"/>
+                <a:satMod val="103000"/>
+                <a:tint val="73000"/>
+              </a:schemeClr>
+            </a:gs>
+            <a:gs pos="100000">
+              <a:schemeClr val="phClr">
+                <a:lumMod val="105000"/>
+                <a:satMod val="109000"/>
+                <a:tint val="81000"/>
+              </a:schemeClr>
+            </a:gs>
+          </a:gsLst>
+          <a:lin ang="5400000" scaled="0"/>
+        </a:gradFill>
+        <a:gradFill rotWithShape="1">
+          <a:gsLst>
+            <a:gs pos="0">
+              <a:schemeClr val="phClr">
+                <a:satMod val="103000"/>
+                <a:lumMod val="102000"/>
+                <a:tint val="94000"/>
+              </a:schemeClr>
+            </a:gs>
+            <a:gs pos="50000">
+              <a:schemeClr val="phClr">
+                <a:satMod val="110000"/>
+                <a:lumMod val="100000"/>
+                <a:shade val="100000"/>
+              </a:schemeClr>
+            </a:gs>
+            <a:gs pos="100000">
+              <a:schemeClr val="phClr">
+                <a:lumMod val="99000"/>
+                <a:satMod val="120000"/>
+                <a:shade val="78000"/>
+              </a:schemeClr>
+            </a:gs>
+          </a:gsLst>
+          <a:lin ang="5400000" scaled="0"/>
+        </a:gradFill>
+      </a:fillStyleLst>
+      <a:lnStyleLst>
+        <a:ln w="6350" cap="flat" cmpd="sng" algn="ctr">
+          <a:solidFill>
+            <a:schemeClr val="phClr"/>
+          </a:solidFill>
+          <a:prstDash val="solid"/>
+          <a:miter lim="800000"/>
+        </a:ln>
+        <a:ln w="12700" cap="flat" cmpd="sng" algn="ctr">
+          <a:solidFill>
+            <a:schemeClr val="phClr"/>
+          </a:solidFill>
+          <a:prstDash val="solid"/>
+          <a:miter lim="800000"/>
+        </a:ln>
+        <a:ln w="19050" cap="flat" cmpd="sng" algn="ctr">
+          <a:solidFill>
+            <a:schemeClr val="phClr"/>
+          </a:solidFill>
+          <a:prstDash val="solid"/>
+          <a:miter lim="800000"/>
+        </a:ln>
+      </a:lnStyleLst>
+      <a:effectStyleLst>
+        <a:effectStyle>
+          <a:effectLst/>
+        </a:effectStyle>
+        <a:effectStyle>
+          <a:effectLst/>
+        </a:effectStyle>
+        <a:effectStyle>
+          <a:effectLst>
+            <a:outerShdw blurRad="57150" dist="19050" dir="5400000" algn="ctr" rotWithShape="0">
+              <a:srgbClr val="000000">
+                <a:alpha val="63000"/>
+              </a:srgbClr>
+            </a:outerShdw>
+          </a:effectLst>
+        </a:effectStyle>
+      </a:effectStyleLst>
+      <a:bgFillStyleLst>
+        <a:solidFill>
+          <a:schemeClr val="phClr"/>
+        </a:solidFill>
+        <a:solidFill>
+          <a:schemeClr val="phClr">
+            <a:tint val="95000"/>
+            <a:satMod val="170000"/>
+          </a:schemeClr>
+        </a:solidFill>
+        <a:gradFill rotWithShape="1">
+          <a:gsLst>
+            <a:gs pos="0">
+              <a:schemeClr val="phClr">
+                <a:tint val="93000"/>
+                <a:satMod val="150000"/>
+                <a:shade val="98000"/>
+                <a:lumMod val="102000"/>
+              </a:schemeClr>
+            </a:gs>
+            <a:gs pos="50000">
+              <a:schemeClr val="phClr">
+                <a:tint val="98000"/>
+                <a:satMod val="130000"/>
+                <a:shade val="90000"/>
+                <a:lumMod val="103000"/>
+              </a:schemeClr>
+            </a:gs>
+            <a:gs pos="100000">
+              <a:schemeClr val="phClr">
+                <a:shade val="63000"/>
+                <a:satMod val="120000"/>
+              </a:schemeClr>
+            </a:gs>
+          </a:gsLst>
+          <a:lin ang="5400000" scaled="0"/>
+        </a:gradFill>
+      </a:bgFillStyleLst>
+    </a:fmtScheme>
+  </a:themeElements>
+  <a:objectDefaults/>
+  <a:extraClrSchemeLst/>
+  <a:extLst>
+    <a:ext uri="{05A4C25C-085E-4340-85A3-A5531E510DB2}">
+      <thm15:themeFamily xmlns:thm15="http://schemas.microsoft.com/office/thememl/2012/main" name="Office Theme" id="{62F939B6-93AF-4DB8-9C6B-D6C7DFDC589F}" vid="{4A3C46E8-61CC-4603-A589-7422A47A8E4A}"/>
+    </a:ext>
+  </a:extLst>
+</a:theme>
 </file>
</xml_diff>